<commit_message>
Fixing file size commits
</commit_message>
<xml_diff>
--- a/Fish Data Analysis/Paper Figures/Figure1_Planning.pptx
+++ b/Fish Data Analysis/Paper Figures/Figure1_Planning.pptx
@@ -2,7 +2,7 @@
 <file path=ppt/presentation.xml><?xml version="1.0" encoding="utf-8"?>
 <p:presentation xmlns:a="http://schemas.openxmlformats.org/drawingml/2006/main" xmlns:r="http://schemas.openxmlformats.org/officeDocument/2006/relationships" xmlns:p="http://schemas.openxmlformats.org/presentationml/2006/main" saveSubsetFonts="1" autoCompressPictures="0">
   <p:sldMasterIdLst>
-    <p:sldMasterId id="2147483648" r:id="rId1"/>
+    <p:sldMasterId id="2147483672" r:id="rId1"/>
   </p:sldMasterIdLst>
   <p:notesMasterIdLst>
     <p:notesMasterId r:id="rId3"/>
@@ -10,13 +10,13 @@
   <p:sldIdLst>
     <p:sldId id="256" r:id="rId2"/>
   </p:sldIdLst>
-  <p:sldSz cx="12192000" cy="6858000"/>
+  <p:sldSz cx="16459200" cy="6858000"/>
   <p:notesSz cx="6858000" cy="9144000"/>
   <p:defaultTextStyle>
     <a:defPPr>
       <a:defRPr lang="en-US"/>
     </a:defPPr>
-    <a:lvl1pPr marL="0" algn="l" defTabSz="914400" rtl="0" eaLnBrk="1" latinLnBrk="0" hangingPunct="1">
+    <a:lvl1pPr marL="0" algn="l" defTabSz="457200" rtl="0" eaLnBrk="1" latinLnBrk="0" hangingPunct="1">
       <a:defRPr sz="1800" kern="1200">
         <a:solidFill>
           <a:schemeClr val="tx1"/>
@@ -26,7 +26,7 @@
         <a:cs typeface="+mn-cs"/>
       </a:defRPr>
     </a:lvl1pPr>
-    <a:lvl2pPr marL="457200" algn="l" defTabSz="914400" rtl="0" eaLnBrk="1" latinLnBrk="0" hangingPunct="1">
+    <a:lvl2pPr marL="457200" algn="l" defTabSz="457200" rtl="0" eaLnBrk="1" latinLnBrk="0" hangingPunct="1">
       <a:defRPr sz="1800" kern="1200">
         <a:solidFill>
           <a:schemeClr val="tx1"/>
@@ -36,7 +36,7 @@
         <a:cs typeface="+mn-cs"/>
       </a:defRPr>
     </a:lvl2pPr>
-    <a:lvl3pPr marL="914400" algn="l" defTabSz="914400" rtl="0" eaLnBrk="1" latinLnBrk="0" hangingPunct="1">
+    <a:lvl3pPr marL="914400" algn="l" defTabSz="457200" rtl="0" eaLnBrk="1" latinLnBrk="0" hangingPunct="1">
       <a:defRPr sz="1800" kern="1200">
         <a:solidFill>
           <a:schemeClr val="tx1"/>
@@ -46,7 +46,7 @@
         <a:cs typeface="+mn-cs"/>
       </a:defRPr>
     </a:lvl3pPr>
-    <a:lvl4pPr marL="1371600" algn="l" defTabSz="914400" rtl="0" eaLnBrk="1" latinLnBrk="0" hangingPunct="1">
+    <a:lvl4pPr marL="1371600" algn="l" defTabSz="457200" rtl="0" eaLnBrk="1" latinLnBrk="0" hangingPunct="1">
       <a:defRPr sz="1800" kern="1200">
         <a:solidFill>
           <a:schemeClr val="tx1"/>
@@ -56,7 +56,7 @@
         <a:cs typeface="+mn-cs"/>
       </a:defRPr>
     </a:lvl4pPr>
-    <a:lvl5pPr marL="1828800" algn="l" defTabSz="914400" rtl="0" eaLnBrk="1" latinLnBrk="0" hangingPunct="1">
+    <a:lvl5pPr marL="1828800" algn="l" defTabSz="457200" rtl="0" eaLnBrk="1" latinLnBrk="0" hangingPunct="1">
       <a:defRPr sz="1800" kern="1200">
         <a:solidFill>
           <a:schemeClr val="tx1"/>
@@ -66,7 +66,7 @@
         <a:cs typeface="+mn-cs"/>
       </a:defRPr>
     </a:lvl5pPr>
-    <a:lvl6pPr marL="2286000" algn="l" defTabSz="914400" rtl="0" eaLnBrk="1" latinLnBrk="0" hangingPunct="1">
+    <a:lvl6pPr marL="2286000" algn="l" defTabSz="457200" rtl="0" eaLnBrk="1" latinLnBrk="0" hangingPunct="1">
       <a:defRPr sz="1800" kern="1200">
         <a:solidFill>
           <a:schemeClr val="tx1"/>
@@ -76,7 +76,7 @@
         <a:cs typeface="+mn-cs"/>
       </a:defRPr>
     </a:lvl6pPr>
-    <a:lvl7pPr marL="2743200" algn="l" defTabSz="914400" rtl="0" eaLnBrk="1" latinLnBrk="0" hangingPunct="1">
+    <a:lvl7pPr marL="2743200" algn="l" defTabSz="457200" rtl="0" eaLnBrk="1" latinLnBrk="0" hangingPunct="1">
       <a:defRPr sz="1800" kern="1200">
         <a:solidFill>
           <a:schemeClr val="tx1"/>
@@ -86,7 +86,7 @@
         <a:cs typeface="+mn-cs"/>
       </a:defRPr>
     </a:lvl7pPr>
-    <a:lvl8pPr marL="3200400" algn="l" defTabSz="914400" rtl="0" eaLnBrk="1" latinLnBrk="0" hangingPunct="1">
+    <a:lvl8pPr marL="3200400" algn="l" defTabSz="457200" rtl="0" eaLnBrk="1" latinLnBrk="0" hangingPunct="1">
       <a:defRPr sz="1800" kern="1200">
         <a:solidFill>
           <a:schemeClr val="tx1"/>
@@ -96,7 +96,7 @@
         <a:cs typeface="+mn-cs"/>
       </a:defRPr>
     </a:lvl8pPr>
-    <a:lvl9pPr marL="3657600" algn="l" defTabSz="914400" rtl="0" eaLnBrk="1" latinLnBrk="0" hangingPunct="1">
+    <a:lvl9pPr marL="3657600" algn="l" defTabSz="457200" rtl="0" eaLnBrk="1" latinLnBrk="0" hangingPunct="1">
       <a:defRPr sz="1800" kern="1200">
         <a:solidFill>
           <a:schemeClr val="tx1"/>
@@ -197,7 +197,7 @@
           <a:p>
             <a:fld id="{F237EBCA-7207-684D-A33C-CBBADFF6B056}" type="datetimeFigureOut">
               <a:rPr lang="en-US" smtClean="0"/>
-              <a:t>5/22/23</a:t>
+              <a:t>9/24/23</a:t>
             </a:fld>
             <a:endParaRPr lang="en-US"/>
           </a:p>
@@ -215,8 +215,8 @@
         </p:nvSpPr>
         <p:spPr>
           <a:xfrm>
-            <a:off x="685800" y="1143000"/>
-            <a:ext cx="5486400" cy="3086100"/>
+            <a:off x="-273050" y="1143000"/>
+            <a:ext cx="7404100" cy="3086100"/>
           </a:xfrm>
           <a:prstGeom prst="rect">
             <a:avLst/>
@@ -491,7 +491,12 @@
             <p:ph type="sldImg"/>
           </p:nvPr>
         </p:nvSpPr>
-        <p:spPr/>
+        <p:spPr>
+          <a:xfrm>
+            <a:off x="-273050" y="1143000"/>
+            <a:ext cx="7404100" cy="3086100"/>
+          </a:xfrm>
+        </p:spPr>
       </p:sp>
       <p:sp>
         <p:nvSpPr>
@@ -567,13 +572,7 @@
       </p:grpSpPr>
       <p:sp>
         <p:nvSpPr>
-          <p:cNvPr id="2" name="Title 1">
-            <a:extLst>
-              <a:ext uri="{FF2B5EF4-FFF2-40B4-BE49-F238E27FC236}">
-                <a16:creationId xmlns:a16="http://schemas.microsoft.com/office/drawing/2014/main" id="{37E1EE65-FEF6-EEC2-1415-6C334EFD7794}"/>
-              </a:ext>
-            </a:extLst>
-          </p:cNvPr>
+          <p:cNvPr id="2" name="Title 1"/>
           <p:cNvSpPr>
             <a:spLocks noGrp="1"/>
           </p:cNvSpPr>
@@ -583,8 +582,8 @@
         </p:nvSpPr>
         <p:spPr>
           <a:xfrm>
-            <a:off x="1524000" y="1122363"/>
-            <a:ext cx="9144000" cy="2387600"/>
+            <a:off x="2057400" y="1122363"/>
+            <a:ext cx="12344400" cy="2387600"/>
           </a:xfrm>
         </p:spPr>
         <p:txBody>
@@ -599,18 +598,13 @@
               <a:rPr lang="en-US"/>
               <a:t>Click to edit Master title style</a:t>
             </a:r>
-          </a:p>
-        </p:txBody>
-      </p:sp>
-      <p:sp>
-        <p:nvSpPr>
-          <p:cNvPr id="3" name="Subtitle 2">
-            <a:extLst>
-              <a:ext uri="{FF2B5EF4-FFF2-40B4-BE49-F238E27FC236}">
-                <a16:creationId xmlns:a16="http://schemas.microsoft.com/office/drawing/2014/main" id="{199F0020-D15D-3DD2-7045-0CC47E922B10}"/>
-              </a:ext>
-            </a:extLst>
-          </p:cNvPr>
+            <a:endParaRPr lang="en-US" dirty="0"/>
+          </a:p>
+        </p:txBody>
+      </p:sp>
+      <p:sp>
+        <p:nvSpPr>
+          <p:cNvPr id="3" name="Subtitle 2"/>
           <p:cNvSpPr>
             <a:spLocks noGrp="1"/>
           </p:cNvSpPr>
@@ -620,8 +614,8 @@
         </p:nvSpPr>
         <p:spPr>
           <a:xfrm>
-            <a:off x="1524000" y="3602038"/>
-            <a:ext cx="9144000" cy="1655762"/>
+            <a:off x="2057400" y="3602038"/>
+            <a:ext cx="12344400" cy="1655762"/>
           </a:xfrm>
         </p:spPr>
         <p:txBody>
@@ -669,18 +663,13 @@
               <a:rPr lang="en-US"/>
               <a:t>Click to edit Master subtitle style</a:t>
             </a:r>
-          </a:p>
-        </p:txBody>
-      </p:sp>
-      <p:sp>
-        <p:nvSpPr>
-          <p:cNvPr id="4" name="Date Placeholder 3">
-            <a:extLst>
-              <a:ext uri="{FF2B5EF4-FFF2-40B4-BE49-F238E27FC236}">
-                <a16:creationId xmlns:a16="http://schemas.microsoft.com/office/drawing/2014/main" id="{80AA2BCC-9797-F5B5-CA06-C5DB99520E13}"/>
-              </a:ext>
-            </a:extLst>
-          </p:cNvPr>
+            <a:endParaRPr lang="en-US" dirty="0"/>
+          </a:p>
+        </p:txBody>
+      </p:sp>
+      <p:sp>
+        <p:nvSpPr>
+          <p:cNvPr id="4" name="Date Placeholder 3"/>
           <p:cNvSpPr>
             <a:spLocks noGrp="1"/>
           </p:cNvSpPr>
@@ -695,7 +684,7 @@
           <a:p>
             <a:fld id="{641330C3-69DC-034B-8C0A-41DF52C199CB}" type="datetimeFigureOut">
               <a:rPr lang="en-US" smtClean="0"/>
-              <a:t>5/22/23</a:t>
+              <a:t>9/24/23</a:t>
             </a:fld>
             <a:endParaRPr lang="en-US"/>
           </a:p>
@@ -703,13 +692,7 @@
       </p:sp>
       <p:sp>
         <p:nvSpPr>
-          <p:cNvPr id="5" name="Footer Placeholder 4">
-            <a:extLst>
-              <a:ext uri="{FF2B5EF4-FFF2-40B4-BE49-F238E27FC236}">
-                <a16:creationId xmlns:a16="http://schemas.microsoft.com/office/drawing/2014/main" id="{1678D149-06A6-3640-8455-1F60DA75E4A1}"/>
-              </a:ext>
-            </a:extLst>
-          </p:cNvPr>
+          <p:cNvPr id="5" name="Footer Placeholder 4"/>
           <p:cNvSpPr>
             <a:spLocks noGrp="1"/>
           </p:cNvSpPr>
@@ -728,13 +711,7 @@
       </p:sp>
       <p:sp>
         <p:nvSpPr>
-          <p:cNvPr id="6" name="Slide Number Placeholder 5">
-            <a:extLst>
-              <a:ext uri="{FF2B5EF4-FFF2-40B4-BE49-F238E27FC236}">
-                <a16:creationId xmlns:a16="http://schemas.microsoft.com/office/drawing/2014/main" id="{71DD7CBF-F5C6-EA65-1BBF-5A49E69AEF31}"/>
-              </a:ext>
-            </a:extLst>
-          </p:cNvPr>
+          <p:cNvPr id="6" name="Slide Number Placeholder 5"/>
           <p:cNvSpPr>
             <a:spLocks noGrp="1"/>
           </p:cNvSpPr>
@@ -758,7 +735,7 @@
     </p:spTree>
     <p:extLst>
       <p:ext uri="{BB962C8B-B14F-4D97-AF65-F5344CB8AC3E}">
-        <p14:creationId xmlns:p14="http://schemas.microsoft.com/office/powerpoint/2010/main" val="2400621648"/>
+        <p14:creationId xmlns:p14="http://schemas.microsoft.com/office/powerpoint/2010/main" val="3070932863"/>
       </p:ext>
     </p:extLst>
   </p:cSld>
@@ -787,13 +764,7 @@
       </p:grpSpPr>
       <p:sp>
         <p:nvSpPr>
-          <p:cNvPr id="2" name="Title 1">
-            <a:extLst>
-              <a:ext uri="{FF2B5EF4-FFF2-40B4-BE49-F238E27FC236}">
-                <a16:creationId xmlns:a16="http://schemas.microsoft.com/office/drawing/2014/main" id="{0B0DFFC4-734F-7E88-2D5E-90DE23C3B166}"/>
-              </a:ext>
-            </a:extLst>
-          </p:cNvPr>
+          <p:cNvPr id="2" name="Title 1"/>
           <p:cNvSpPr>
             <a:spLocks noGrp="1"/>
           </p:cNvSpPr>
@@ -810,18 +781,13 @@
               <a:rPr lang="en-US"/>
               <a:t>Click to edit Master title style</a:t>
             </a:r>
-          </a:p>
-        </p:txBody>
-      </p:sp>
-      <p:sp>
-        <p:nvSpPr>
-          <p:cNvPr id="3" name="Vertical Text Placeholder 2">
-            <a:extLst>
-              <a:ext uri="{FF2B5EF4-FFF2-40B4-BE49-F238E27FC236}">
-                <a16:creationId xmlns:a16="http://schemas.microsoft.com/office/drawing/2014/main" id="{29C5130A-E653-02D0-7863-C11D41F43F1D}"/>
-              </a:ext>
-            </a:extLst>
-          </p:cNvPr>
+            <a:endParaRPr lang="en-US" dirty="0"/>
+          </a:p>
+        </p:txBody>
+      </p:sp>
+      <p:sp>
+        <p:nvSpPr>
+          <p:cNvPr id="3" name="Vertical Text Placeholder 2"/>
           <p:cNvSpPr>
             <a:spLocks noGrp="1"/>
           </p:cNvSpPr>
@@ -867,18 +833,13 @@
               <a:rPr lang="en-US"/>
               <a:t>Fifth level</a:t>
             </a:r>
-          </a:p>
-        </p:txBody>
-      </p:sp>
-      <p:sp>
-        <p:nvSpPr>
-          <p:cNvPr id="4" name="Date Placeholder 3">
-            <a:extLst>
-              <a:ext uri="{FF2B5EF4-FFF2-40B4-BE49-F238E27FC236}">
-                <a16:creationId xmlns:a16="http://schemas.microsoft.com/office/drawing/2014/main" id="{4746198F-1B54-97F5-2E99-7EA75AE03587}"/>
-              </a:ext>
-            </a:extLst>
-          </p:cNvPr>
+            <a:endParaRPr lang="en-US" dirty="0"/>
+          </a:p>
+        </p:txBody>
+      </p:sp>
+      <p:sp>
+        <p:nvSpPr>
+          <p:cNvPr id="4" name="Date Placeholder 3"/>
           <p:cNvSpPr>
             <a:spLocks noGrp="1"/>
           </p:cNvSpPr>
@@ -893,7 +854,7 @@
           <a:p>
             <a:fld id="{641330C3-69DC-034B-8C0A-41DF52C199CB}" type="datetimeFigureOut">
               <a:rPr lang="en-US" smtClean="0"/>
-              <a:t>5/22/23</a:t>
+              <a:t>9/24/23</a:t>
             </a:fld>
             <a:endParaRPr lang="en-US"/>
           </a:p>
@@ -901,13 +862,7 @@
       </p:sp>
       <p:sp>
         <p:nvSpPr>
-          <p:cNvPr id="5" name="Footer Placeholder 4">
-            <a:extLst>
-              <a:ext uri="{FF2B5EF4-FFF2-40B4-BE49-F238E27FC236}">
-                <a16:creationId xmlns:a16="http://schemas.microsoft.com/office/drawing/2014/main" id="{E643F803-113F-0807-AA8A-50E343E8B2A6}"/>
-              </a:ext>
-            </a:extLst>
-          </p:cNvPr>
+          <p:cNvPr id="5" name="Footer Placeholder 4"/>
           <p:cNvSpPr>
             <a:spLocks noGrp="1"/>
           </p:cNvSpPr>
@@ -926,13 +881,7 @@
       </p:sp>
       <p:sp>
         <p:nvSpPr>
-          <p:cNvPr id="6" name="Slide Number Placeholder 5">
-            <a:extLst>
-              <a:ext uri="{FF2B5EF4-FFF2-40B4-BE49-F238E27FC236}">
-                <a16:creationId xmlns:a16="http://schemas.microsoft.com/office/drawing/2014/main" id="{D57754B2-86FC-4978-ED9E-24391FB72141}"/>
-              </a:ext>
-            </a:extLst>
-          </p:cNvPr>
+          <p:cNvPr id="6" name="Slide Number Placeholder 5"/>
           <p:cNvSpPr>
             <a:spLocks noGrp="1"/>
           </p:cNvSpPr>
@@ -956,7 +905,7 @@
     </p:spTree>
     <p:extLst>
       <p:ext uri="{BB962C8B-B14F-4D97-AF65-F5344CB8AC3E}">
-        <p14:creationId xmlns:p14="http://schemas.microsoft.com/office/powerpoint/2010/main" val="3126684991"/>
+        <p14:creationId xmlns:p14="http://schemas.microsoft.com/office/powerpoint/2010/main" val="2802123100"/>
       </p:ext>
     </p:extLst>
   </p:cSld>
@@ -985,13 +934,7 @@
       </p:grpSpPr>
       <p:sp>
         <p:nvSpPr>
-          <p:cNvPr id="2" name="Vertical Title 1">
-            <a:extLst>
-              <a:ext uri="{FF2B5EF4-FFF2-40B4-BE49-F238E27FC236}">
-                <a16:creationId xmlns:a16="http://schemas.microsoft.com/office/drawing/2014/main" id="{C80FC75D-4B83-AE9F-E3B4-3705789847C6}"/>
-              </a:ext>
-            </a:extLst>
-          </p:cNvPr>
+          <p:cNvPr id="2" name="Vertical Title 1"/>
           <p:cNvSpPr>
             <a:spLocks noGrp="1"/>
           </p:cNvSpPr>
@@ -1001,8 +944,8 @@
         </p:nvSpPr>
         <p:spPr>
           <a:xfrm>
-            <a:off x="8724900" y="365125"/>
-            <a:ext cx="2628900" cy="5811838"/>
+            <a:off x="11778615" y="365125"/>
+            <a:ext cx="3549015" cy="5811838"/>
           </a:xfrm>
         </p:spPr>
         <p:txBody>
@@ -1013,18 +956,13 @@
               <a:rPr lang="en-US"/>
               <a:t>Click to edit Master title style</a:t>
             </a:r>
-          </a:p>
-        </p:txBody>
-      </p:sp>
-      <p:sp>
-        <p:nvSpPr>
-          <p:cNvPr id="3" name="Vertical Text Placeholder 2">
-            <a:extLst>
-              <a:ext uri="{FF2B5EF4-FFF2-40B4-BE49-F238E27FC236}">
-                <a16:creationId xmlns:a16="http://schemas.microsoft.com/office/drawing/2014/main" id="{3E9296B5-10AB-D346-96C4-960B24DE094A}"/>
-              </a:ext>
-            </a:extLst>
-          </p:cNvPr>
+            <a:endParaRPr lang="en-US" dirty="0"/>
+          </a:p>
+        </p:txBody>
+      </p:sp>
+      <p:sp>
+        <p:nvSpPr>
+          <p:cNvPr id="3" name="Vertical Text Placeholder 2"/>
           <p:cNvSpPr>
             <a:spLocks noGrp="1"/>
           </p:cNvSpPr>
@@ -1034,8 +972,8 @@
         </p:nvSpPr>
         <p:spPr>
           <a:xfrm>
-            <a:off x="838200" y="365125"/>
-            <a:ext cx="7734300" cy="5811838"/>
+            <a:off x="1131570" y="365125"/>
+            <a:ext cx="10441305" cy="5811838"/>
           </a:xfrm>
         </p:spPr>
         <p:txBody>
@@ -1075,18 +1013,13 @@
               <a:rPr lang="en-US"/>
               <a:t>Fifth level</a:t>
             </a:r>
-          </a:p>
-        </p:txBody>
-      </p:sp>
-      <p:sp>
-        <p:nvSpPr>
-          <p:cNvPr id="4" name="Date Placeholder 3">
-            <a:extLst>
-              <a:ext uri="{FF2B5EF4-FFF2-40B4-BE49-F238E27FC236}">
-                <a16:creationId xmlns:a16="http://schemas.microsoft.com/office/drawing/2014/main" id="{7FF27D37-2D63-5CA3-8FB4-0A176D5E49D0}"/>
-              </a:ext>
-            </a:extLst>
-          </p:cNvPr>
+            <a:endParaRPr lang="en-US" dirty="0"/>
+          </a:p>
+        </p:txBody>
+      </p:sp>
+      <p:sp>
+        <p:nvSpPr>
+          <p:cNvPr id="4" name="Date Placeholder 3"/>
           <p:cNvSpPr>
             <a:spLocks noGrp="1"/>
           </p:cNvSpPr>
@@ -1101,7 +1034,7 @@
           <a:p>
             <a:fld id="{641330C3-69DC-034B-8C0A-41DF52C199CB}" type="datetimeFigureOut">
               <a:rPr lang="en-US" smtClean="0"/>
-              <a:t>5/22/23</a:t>
+              <a:t>9/24/23</a:t>
             </a:fld>
             <a:endParaRPr lang="en-US"/>
           </a:p>
@@ -1109,13 +1042,7 @@
       </p:sp>
       <p:sp>
         <p:nvSpPr>
-          <p:cNvPr id="5" name="Footer Placeholder 4">
-            <a:extLst>
-              <a:ext uri="{FF2B5EF4-FFF2-40B4-BE49-F238E27FC236}">
-                <a16:creationId xmlns:a16="http://schemas.microsoft.com/office/drawing/2014/main" id="{6C99E872-4330-EA0F-C765-F1AB3756F830}"/>
-              </a:ext>
-            </a:extLst>
-          </p:cNvPr>
+          <p:cNvPr id="5" name="Footer Placeholder 4"/>
           <p:cNvSpPr>
             <a:spLocks noGrp="1"/>
           </p:cNvSpPr>
@@ -1134,13 +1061,7 @@
       </p:sp>
       <p:sp>
         <p:nvSpPr>
-          <p:cNvPr id="6" name="Slide Number Placeholder 5">
-            <a:extLst>
-              <a:ext uri="{FF2B5EF4-FFF2-40B4-BE49-F238E27FC236}">
-                <a16:creationId xmlns:a16="http://schemas.microsoft.com/office/drawing/2014/main" id="{2DD9F238-04FC-F37C-0595-CBCDF7E04FBB}"/>
-              </a:ext>
-            </a:extLst>
-          </p:cNvPr>
+          <p:cNvPr id="6" name="Slide Number Placeholder 5"/>
           <p:cNvSpPr>
             <a:spLocks noGrp="1"/>
           </p:cNvSpPr>
@@ -1164,7 +1085,7 @@
     </p:spTree>
     <p:extLst>
       <p:ext uri="{BB962C8B-B14F-4D97-AF65-F5344CB8AC3E}">
-        <p14:creationId xmlns:p14="http://schemas.microsoft.com/office/powerpoint/2010/main" val="1761728557"/>
+        <p14:creationId xmlns:p14="http://schemas.microsoft.com/office/powerpoint/2010/main" val="368978179"/>
       </p:ext>
     </p:extLst>
   </p:cSld>
@@ -1193,13 +1114,7 @@
       </p:grpSpPr>
       <p:sp>
         <p:nvSpPr>
-          <p:cNvPr id="2" name="Title 1">
-            <a:extLst>
-              <a:ext uri="{FF2B5EF4-FFF2-40B4-BE49-F238E27FC236}">
-                <a16:creationId xmlns:a16="http://schemas.microsoft.com/office/drawing/2014/main" id="{03585B54-9F70-8C24-17BE-1B034F47FE80}"/>
-              </a:ext>
-            </a:extLst>
-          </p:cNvPr>
+          <p:cNvPr id="2" name="Title 1"/>
           <p:cNvSpPr>
             <a:spLocks noGrp="1"/>
           </p:cNvSpPr>
@@ -1216,18 +1131,13 @@
               <a:rPr lang="en-US"/>
               <a:t>Click to edit Master title style</a:t>
             </a:r>
-          </a:p>
-        </p:txBody>
-      </p:sp>
-      <p:sp>
-        <p:nvSpPr>
-          <p:cNvPr id="3" name="Content Placeholder 2">
-            <a:extLst>
-              <a:ext uri="{FF2B5EF4-FFF2-40B4-BE49-F238E27FC236}">
-                <a16:creationId xmlns:a16="http://schemas.microsoft.com/office/drawing/2014/main" id="{A802989E-98F0-479A-3E07-DCB7367DD129}"/>
-              </a:ext>
-            </a:extLst>
-          </p:cNvPr>
+            <a:endParaRPr lang="en-US" dirty="0"/>
+          </a:p>
+        </p:txBody>
+      </p:sp>
+      <p:sp>
+        <p:nvSpPr>
+          <p:cNvPr id="3" name="Content Placeholder 2"/>
           <p:cNvSpPr>
             <a:spLocks noGrp="1"/>
           </p:cNvSpPr>
@@ -1273,18 +1183,13 @@
               <a:rPr lang="en-US"/>
               <a:t>Fifth level</a:t>
             </a:r>
-          </a:p>
-        </p:txBody>
-      </p:sp>
-      <p:sp>
-        <p:nvSpPr>
-          <p:cNvPr id="4" name="Date Placeholder 3">
-            <a:extLst>
-              <a:ext uri="{FF2B5EF4-FFF2-40B4-BE49-F238E27FC236}">
-                <a16:creationId xmlns:a16="http://schemas.microsoft.com/office/drawing/2014/main" id="{4B447274-2D9A-CF8E-38F2-388B18CDB45C}"/>
-              </a:ext>
-            </a:extLst>
-          </p:cNvPr>
+            <a:endParaRPr lang="en-US" dirty="0"/>
+          </a:p>
+        </p:txBody>
+      </p:sp>
+      <p:sp>
+        <p:nvSpPr>
+          <p:cNvPr id="4" name="Date Placeholder 3"/>
           <p:cNvSpPr>
             <a:spLocks noGrp="1"/>
           </p:cNvSpPr>
@@ -1299,7 +1204,7 @@
           <a:p>
             <a:fld id="{641330C3-69DC-034B-8C0A-41DF52C199CB}" type="datetimeFigureOut">
               <a:rPr lang="en-US" smtClean="0"/>
-              <a:t>5/22/23</a:t>
+              <a:t>9/24/23</a:t>
             </a:fld>
             <a:endParaRPr lang="en-US"/>
           </a:p>
@@ -1307,13 +1212,7 @@
       </p:sp>
       <p:sp>
         <p:nvSpPr>
-          <p:cNvPr id="5" name="Footer Placeholder 4">
-            <a:extLst>
-              <a:ext uri="{FF2B5EF4-FFF2-40B4-BE49-F238E27FC236}">
-                <a16:creationId xmlns:a16="http://schemas.microsoft.com/office/drawing/2014/main" id="{E134285E-FADF-4B4D-E86A-95C39305A649}"/>
-              </a:ext>
-            </a:extLst>
-          </p:cNvPr>
+          <p:cNvPr id="5" name="Footer Placeholder 4"/>
           <p:cNvSpPr>
             <a:spLocks noGrp="1"/>
           </p:cNvSpPr>
@@ -1332,13 +1231,7 @@
       </p:sp>
       <p:sp>
         <p:nvSpPr>
-          <p:cNvPr id="6" name="Slide Number Placeholder 5">
-            <a:extLst>
-              <a:ext uri="{FF2B5EF4-FFF2-40B4-BE49-F238E27FC236}">
-                <a16:creationId xmlns:a16="http://schemas.microsoft.com/office/drawing/2014/main" id="{305E6653-CBF6-3CB6-1B49-16142B687583}"/>
-              </a:ext>
-            </a:extLst>
-          </p:cNvPr>
+          <p:cNvPr id="6" name="Slide Number Placeholder 5"/>
           <p:cNvSpPr>
             <a:spLocks noGrp="1"/>
           </p:cNvSpPr>
@@ -1362,7 +1255,7 @@
     </p:spTree>
     <p:extLst>
       <p:ext uri="{BB962C8B-B14F-4D97-AF65-F5344CB8AC3E}">
-        <p14:creationId xmlns:p14="http://schemas.microsoft.com/office/powerpoint/2010/main" val="3651453381"/>
+        <p14:creationId xmlns:p14="http://schemas.microsoft.com/office/powerpoint/2010/main" val="891846516"/>
       </p:ext>
     </p:extLst>
   </p:cSld>
@@ -1391,13 +1284,7 @@
       </p:grpSpPr>
       <p:sp>
         <p:nvSpPr>
-          <p:cNvPr id="2" name="Title 1">
-            <a:extLst>
-              <a:ext uri="{FF2B5EF4-FFF2-40B4-BE49-F238E27FC236}">
-                <a16:creationId xmlns:a16="http://schemas.microsoft.com/office/drawing/2014/main" id="{2D4D8FB9-3C24-BD6B-B2E5-D7142C74A048}"/>
-              </a:ext>
-            </a:extLst>
-          </p:cNvPr>
+          <p:cNvPr id="2" name="Title 1"/>
           <p:cNvSpPr>
             <a:spLocks noGrp="1"/>
           </p:cNvSpPr>
@@ -1407,8 +1294,8 @@
         </p:nvSpPr>
         <p:spPr>
           <a:xfrm>
-            <a:off x="831850" y="1709738"/>
-            <a:ext cx="10515600" cy="2852737"/>
+            <a:off x="1122997" y="1709738"/>
+            <a:ext cx="14196060" cy="2852737"/>
           </a:xfrm>
         </p:spPr>
         <p:txBody>
@@ -1423,18 +1310,13 @@
               <a:rPr lang="en-US"/>
               <a:t>Click to edit Master title style</a:t>
             </a:r>
-          </a:p>
-        </p:txBody>
-      </p:sp>
-      <p:sp>
-        <p:nvSpPr>
-          <p:cNvPr id="3" name="Text Placeholder 2">
-            <a:extLst>
-              <a:ext uri="{FF2B5EF4-FFF2-40B4-BE49-F238E27FC236}">
-                <a16:creationId xmlns:a16="http://schemas.microsoft.com/office/drawing/2014/main" id="{06A479B5-CD8D-F5FB-2258-50F28A13B821}"/>
-              </a:ext>
-            </a:extLst>
-          </p:cNvPr>
+            <a:endParaRPr lang="en-US" dirty="0"/>
+          </a:p>
+        </p:txBody>
+      </p:sp>
+      <p:sp>
+        <p:nvSpPr>
+          <p:cNvPr id="3" name="Text Placeholder 2"/>
           <p:cNvSpPr>
             <a:spLocks noGrp="1"/>
           </p:cNvSpPr>
@@ -1444,8 +1326,8 @@
         </p:nvSpPr>
         <p:spPr>
           <a:xfrm>
-            <a:off x="831850" y="4589463"/>
-            <a:ext cx="10515600" cy="1500187"/>
+            <a:off x="1122997" y="4589464"/>
+            <a:ext cx="14196060" cy="1500187"/>
           </a:xfrm>
         </p:spPr>
         <p:txBody>
@@ -1553,13 +1435,7 @@
       </p:sp>
       <p:sp>
         <p:nvSpPr>
-          <p:cNvPr id="4" name="Date Placeholder 3">
-            <a:extLst>
-              <a:ext uri="{FF2B5EF4-FFF2-40B4-BE49-F238E27FC236}">
-                <a16:creationId xmlns:a16="http://schemas.microsoft.com/office/drawing/2014/main" id="{A3BF6D94-E3EF-BF7B-9412-F2B1D1D56ED5}"/>
-              </a:ext>
-            </a:extLst>
-          </p:cNvPr>
+          <p:cNvPr id="4" name="Date Placeholder 3"/>
           <p:cNvSpPr>
             <a:spLocks noGrp="1"/>
           </p:cNvSpPr>
@@ -1574,7 +1450,7 @@
           <a:p>
             <a:fld id="{641330C3-69DC-034B-8C0A-41DF52C199CB}" type="datetimeFigureOut">
               <a:rPr lang="en-US" smtClean="0"/>
-              <a:t>5/22/23</a:t>
+              <a:t>9/24/23</a:t>
             </a:fld>
             <a:endParaRPr lang="en-US"/>
           </a:p>
@@ -1582,13 +1458,7 @@
       </p:sp>
       <p:sp>
         <p:nvSpPr>
-          <p:cNvPr id="5" name="Footer Placeholder 4">
-            <a:extLst>
-              <a:ext uri="{FF2B5EF4-FFF2-40B4-BE49-F238E27FC236}">
-                <a16:creationId xmlns:a16="http://schemas.microsoft.com/office/drawing/2014/main" id="{2EF7A97F-5FFB-DEE1-11C8-39E2E954BF28}"/>
-              </a:ext>
-            </a:extLst>
-          </p:cNvPr>
+          <p:cNvPr id="5" name="Footer Placeholder 4"/>
           <p:cNvSpPr>
             <a:spLocks noGrp="1"/>
           </p:cNvSpPr>
@@ -1607,13 +1477,7 @@
       </p:sp>
       <p:sp>
         <p:nvSpPr>
-          <p:cNvPr id="6" name="Slide Number Placeholder 5">
-            <a:extLst>
-              <a:ext uri="{FF2B5EF4-FFF2-40B4-BE49-F238E27FC236}">
-                <a16:creationId xmlns:a16="http://schemas.microsoft.com/office/drawing/2014/main" id="{80598122-CE6E-AE40-A1CD-16FB1ABAB2E0}"/>
-              </a:ext>
-            </a:extLst>
-          </p:cNvPr>
+          <p:cNvPr id="6" name="Slide Number Placeholder 5"/>
           <p:cNvSpPr>
             <a:spLocks noGrp="1"/>
           </p:cNvSpPr>
@@ -1637,7 +1501,7 @@
     </p:spTree>
     <p:extLst>
       <p:ext uri="{BB962C8B-B14F-4D97-AF65-F5344CB8AC3E}">
-        <p14:creationId xmlns:p14="http://schemas.microsoft.com/office/powerpoint/2010/main" val="2556057791"/>
+        <p14:creationId xmlns:p14="http://schemas.microsoft.com/office/powerpoint/2010/main" val="1858702319"/>
       </p:ext>
     </p:extLst>
   </p:cSld>
@@ -1666,13 +1530,7 @@
       </p:grpSpPr>
       <p:sp>
         <p:nvSpPr>
-          <p:cNvPr id="2" name="Title 1">
-            <a:extLst>
-              <a:ext uri="{FF2B5EF4-FFF2-40B4-BE49-F238E27FC236}">
-                <a16:creationId xmlns:a16="http://schemas.microsoft.com/office/drawing/2014/main" id="{30304444-173D-50C5-19D1-72B6FA439FA5}"/>
-              </a:ext>
-            </a:extLst>
-          </p:cNvPr>
+          <p:cNvPr id="2" name="Title 1"/>
           <p:cNvSpPr>
             <a:spLocks noGrp="1"/>
           </p:cNvSpPr>
@@ -1689,18 +1547,13 @@
               <a:rPr lang="en-US"/>
               <a:t>Click to edit Master title style</a:t>
             </a:r>
-          </a:p>
-        </p:txBody>
-      </p:sp>
-      <p:sp>
-        <p:nvSpPr>
-          <p:cNvPr id="3" name="Content Placeholder 2">
-            <a:extLst>
-              <a:ext uri="{FF2B5EF4-FFF2-40B4-BE49-F238E27FC236}">
-                <a16:creationId xmlns:a16="http://schemas.microsoft.com/office/drawing/2014/main" id="{7DD3CAA1-C68C-D130-F94C-5F65E4B1BC70}"/>
-              </a:ext>
-            </a:extLst>
-          </p:cNvPr>
+            <a:endParaRPr lang="en-US" dirty="0"/>
+          </a:p>
+        </p:txBody>
+      </p:sp>
+      <p:sp>
+        <p:nvSpPr>
+          <p:cNvPr id="3" name="Content Placeholder 2"/>
           <p:cNvSpPr>
             <a:spLocks noGrp="1"/>
           </p:cNvSpPr>
@@ -1710,8 +1563,8 @@
         </p:nvSpPr>
         <p:spPr>
           <a:xfrm>
-            <a:off x="838200" y="1825625"/>
-            <a:ext cx="5181600" cy="4351338"/>
+            <a:off x="1131570" y="1825625"/>
+            <a:ext cx="6995160" cy="4351338"/>
           </a:xfrm>
         </p:spPr>
         <p:txBody>
@@ -1751,18 +1604,13 @@
               <a:rPr lang="en-US"/>
               <a:t>Fifth level</a:t>
             </a:r>
-          </a:p>
-        </p:txBody>
-      </p:sp>
-      <p:sp>
-        <p:nvSpPr>
-          <p:cNvPr id="4" name="Content Placeholder 3">
-            <a:extLst>
-              <a:ext uri="{FF2B5EF4-FFF2-40B4-BE49-F238E27FC236}">
-                <a16:creationId xmlns:a16="http://schemas.microsoft.com/office/drawing/2014/main" id="{9DBF7BBF-E7E1-093A-7778-EC8A75FCBE56}"/>
-              </a:ext>
-            </a:extLst>
-          </p:cNvPr>
+            <a:endParaRPr lang="en-US" dirty="0"/>
+          </a:p>
+        </p:txBody>
+      </p:sp>
+      <p:sp>
+        <p:nvSpPr>
+          <p:cNvPr id="4" name="Content Placeholder 3"/>
           <p:cNvSpPr>
             <a:spLocks noGrp="1"/>
           </p:cNvSpPr>
@@ -1772,8 +1620,8 @@
         </p:nvSpPr>
         <p:spPr>
           <a:xfrm>
-            <a:off x="6172200" y="1825625"/>
-            <a:ext cx="5181600" cy="4351338"/>
+            <a:off x="8332470" y="1825625"/>
+            <a:ext cx="6995160" cy="4351338"/>
           </a:xfrm>
         </p:spPr>
         <p:txBody>
@@ -1813,18 +1661,13 @@
               <a:rPr lang="en-US"/>
               <a:t>Fifth level</a:t>
             </a:r>
-          </a:p>
-        </p:txBody>
-      </p:sp>
-      <p:sp>
-        <p:nvSpPr>
-          <p:cNvPr id="5" name="Date Placeholder 4">
-            <a:extLst>
-              <a:ext uri="{FF2B5EF4-FFF2-40B4-BE49-F238E27FC236}">
-                <a16:creationId xmlns:a16="http://schemas.microsoft.com/office/drawing/2014/main" id="{C8F26352-3790-97C9-51B1-4FA7BE57CFF9}"/>
-              </a:ext>
-            </a:extLst>
-          </p:cNvPr>
+            <a:endParaRPr lang="en-US" dirty="0"/>
+          </a:p>
+        </p:txBody>
+      </p:sp>
+      <p:sp>
+        <p:nvSpPr>
+          <p:cNvPr id="5" name="Date Placeholder 4"/>
           <p:cNvSpPr>
             <a:spLocks noGrp="1"/>
           </p:cNvSpPr>
@@ -1839,7 +1682,7 @@
           <a:p>
             <a:fld id="{641330C3-69DC-034B-8C0A-41DF52C199CB}" type="datetimeFigureOut">
               <a:rPr lang="en-US" smtClean="0"/>
-              <a:t>5/22/23</a:t>
+              <a:t>9/24/23</a:t>
             </a:fld>
             <a:endParaRPr lang="en-US"/>
           </a:p>
@@ -1847,13 +1690,7 @@
       </p:sp>
       <p:sp>
         <p:nvSpPr>
-          <p:cNvPr id="6" name="Footer Placeholder 5">
-            <a:extLst>
-              <a:ext uri="{FF2B5EF4-FFF2-40B4-BE49-F238E27FC236}">
-                <a16:creationId xmlns:a16="http://schemas.microsoft.com/office/drawing/2014/main" id="{87E4039B-DF2B-BB4C-E788-BD525A716798}"/>
-              </a:ext>
-            </a:extLst>
-          </p:cNvPr>
+          <p:cNvPr id="6" name="Footer Placeholder 5"/>
           <p:cNvSpPr>
             <a:spLocks noGrp="1"/>
           </p:cNvSpPr>
@@ -1872,13 +1709,7 @@
       </p:sp>
       <p:sp>
         <p:nvSpPr>
-          <p:cNvPr id="7" name="Slide Number Placeholder 6">
-            <a:extLst>
-              <a:ext uri="{FF2B5EF4-FFF2-40B4-BE49-F238E27FC236}">
-                <a16:creationId xmlns:a16="http://schemas.microsoft.com/office/drawing/2014/main" id="{11792629-FD2E-5099-4B6C-367277FB2938}"/>
-              </a:ext>
-            </a:extLst>
-          </p:cNvPr>
+          <p:cNvPr id="7" name="Slide Number Placeholder 6"/>
           <p:cNvSpPr>
             <a:spLocks noGrp="1"/>
           </p:cNvSpPr>
@@ -1902,7 +1733,7 @@
     </p:spTree>
     <p:extLst>
       <p:ext uri="{BB962C8B-B14F-4D97-AF65-F5344CB8AC3E}">
-        <p14:creationId xmlns:p14="http://schemas.microsoft.com/office/powerpoint/2010/main" val="2802098746"/>
+        <p14:creationId xmlns:p14="http://schemas.microsoft.com/office/powerpoint/2010/main" val="296329403"/>
       </p:ext>
     </p:extLst>
   </p:cSld>
@@ -1931,13 +1762,7 @@
       </p:grpSpPr>
       <p:sp>
         <p:nvSpPr>
-          <p:cNvPr id="2" name="Title 1">
-            <a:extLst>
-              <a:ext uri="{FF2B5EF4-FFF2-40B4-BE49-F238E27FC236}">
-                <a16:creationId xmlns:a16="http://schemas.microsoft.com/office/drawing/2014/main" id="{7850B962-54F3-9049-73D8-8CE33926F893}"/>
-              </a:ext>
-            </a:extLst>
-          </p:cNvPr>
+          <p:cNvPr id="2" name="Title 1"/>
           <p:cNvSpPr>
             <a:spLocks noGrp="1"/>
           </p:cNvSpPr>
@@ -1947,8 +1772,8 @@
         </p:nvSpPr>
         <p:spPr>
           <a:xfrm>
-            <a:off x="839788" y="365125"/>
-            <a:ext cx="10515600" cy="1325563"/>
+            <a:off x="1133714" y="365126"/>
+            <a:ext cx="14196060" cy="1325563"/>
           </a:xfrm>
         </p:spPr>
         <p:txBody>
@@ -1959,18 +1784,13 @@
               <a:rPr lang="en-US"/>
               <a:t>Click to edit Master title style</a:t>
             </a:r>
-          </a:p>
-        </p:txBody>
-      </p:sp>
-      <p:sp>
-        <p:nvSpPr>
-          <p:cNvPr id="3" name="Text Placeholder 2">
-            <a:extLst>
-              <a:ext uri="{FF2B5EF4-FFF2-40B4-BE49-F238E27FC236}">
-                <a16:creationId xmlns:a16="http://schemas.microsoft.com/office/drawing/2014/main" id="{A44EDC23-390D-4B88-F39A-ED0543CD3A88}"/>
-              </a:ext>
-            </a:extLst>
-          </p:cNvPr>
+            <a:endParaRPr lang="en-US" dirty="0"/>
+          </a:p>
+        </p:txBody>
+      </p:sp>
+      <p:sp>
+        <p:nvSpPr>
+          <p:cNvPr id="3" name="Text Placeholder 2"/>
           <p:cNvSpPr>
             <a:spLocks noGrp="1"/>
           </p:cNvSpPr>
@@ -1980,8 +1800,8 @@
         </p:nvSpPr>
         <p:spPr>
           <a:xfrm>
-            <a:off x="839788" y="1681163"/>
-            <a:ext cx="5157787" cy="823912"/>
+            <a:off x="1133715" y="1681163"/>
+            <a:ext cx="6963012" cy="823912"/>
           </a:xfrm>
         </p:spPr>
         <p:txBody>
@@ -2035,13 +1855,7 @@
       </p:sp>
       <p:sp>
         <p:nvSpPr>
-          <p:cNvPr id="4" name="Content Placeholder 3">
-            <a:extLst>
-              <a:ext uri="{FF2B5EF4-FFF2-40B4-BE49-F238E27FC236}">
-                <a16:creationId xmlns:a16="http://schemas.microsoft.com/office/drawing/2014/main" id="{C1B61687-96CD-D712-01A7-E35E490DEA42}"/>
-              </a:ext>
-            </a:extLst>
-          </p:cNvPr>
+          <p:cNvPr id="4" name="Content Placeholder 3"/>
           <p:cNvSpPr>
             <a:spLocks noGrp="1"/>
           </p:cNvSpPr>
@@ -2051,8 +1865,8 @@
         </p:nvSpPr>
         <p:spPr>
           <a:xfrm>
-            <a:off x="839788" y="2505075"/>
-            <a:ext cx="5157787" cy="3684588"/>
+            <a:off x="1133715" y="2505075"/>
+            <a:ext cx="6963012" cy="3684588"/>
           </a:xfrm>
         </p:spPr>
         <p:txBody>
@@ -2092,18 +1906,13 @@
               <a:rPr lang="en-US"/>
               <a:t>Fifth level</a:t>
             </a:r>
-          </a:p>
-        </p:txBody>
-      </p:sp>
-      <p:sp>
-        <p:nvSpPr>
-          <p:cNvPr id="5" name="Text Placeholder 4">
-            <a:extLst>
-              <a:ext uri="{FF2B5EF4-FFF2-40B4-BE49-F238E27FC236}">
-                <a16:creationId xmlns:a16="http://schemas.microsoft.com/office/drawing/2014/main" id="{94D7844B-BC31-58CD-AA40-6BEFFF5EEE85}"/>
-              </a:ext>
-            </a:extLst>
-          </p:cNvPr>
+            <a:endParaRPr lang="en-US" dirty="0"/>
+          </a:p>
+        </p:txBody>
+      </p:sp>
+      <p:sp>
+        <p:nvSpPr>
+          <p:cNvPr id="5" name="Text Placeholder 4"/>
           <p:cNvSpPr>
             <a:spLocks noGrp="1"/>
           </p:cNvSpPr>
@@ -2113,8 +1922,8 @@
         </p:nvSpPr>
         <p:spPr>
           <a:xfrm>
-            <a:off x="6172200" y="1681163"/>
-            <a:ext cx="5183188" cy="823912"/>
+            <a:off x="8332470" y="1681163"/>
+            <a:ext cx="6997304" cy="823912"/>
           </a:xfrm>
         </p:spPr>
         <p:txBody>
@@ -2168,13 +1977,7 @@
       </p:sp>
       <p:sp>
         <p:nvSpPr>
-          <p:cNvPr id="6" name="Content Placeholder 5">
-            <a:extLst>
-              <a:ext uri="{FF2B5EF4-FFF2-40B4-BE49-F238E27FC236}">
-                <a16:creationId xmlns:a16="http://schemas.microsoft.com/office/drawing/2014/main" id="{00C93191-5D37-BE69-888D-510A51E1E8AA}"/>
-              </a:ext>
-            </a:extLst>
-          </p:cNvPr>
+          <p:cNvPr id="6" name="Content Placeholder 5"/>
           <p:cNvSpPr>
             <a:spLocks noGrp="1"/>
           </p:cNvSpPr>
@@ -2184,8 +1987,8 @@
         </p:nvSpPr>
         <p:spPr>
           <a:xfrm>
-            <a:off x="6172200" y="2505075"/>
-            <a:ext cx="5183188" cy="3684588"/>
+            <a:off x="8332470" y="2505075"/>
+            <a:ext cx="6997304" cy="3684588"/>
           </a:xfrm>
         </p:spPr>
         <p:txBody>
@@ -2225,18 +2028,13 @@
               <a:rPr lang="en-US"/>
               <a:t>Fifth level</a:t>
             </a:r>
-          </a:p>
-        </p:txBody>
-      </p:sp>
-      <p:sp>
-        <p:nvSpPr>
-          <p:cNvPr id="7" name="Date Placeholder 6">
-            <a:extLst>
-              <a:ext uri="{FF2B5EF4-FFF2-40B4-BE49-F238E27FC236}">
-                <a16:creationId xmlns:a16="http://schemas.microsoft.com/office/drawing/2014/main" id="{FA12EFC6-E39B-1AA9-40F7-791DE1B8B8BF}"/>
-              </a:ext>
-            </a:extLst>
-          </p:cNvPr>
+            <a:endParaRPr lang="en-US" dirty="0"/>
+          </a:p>
+        </p:txBody>
+      </p:sp>
+      <p:sp>
+        <p:nvSpPr>
+          <p:cNvPr id="7" name="Date Placeholder 6"/>
           <p:cNvSpPr>
             <a:spLocks noGrp="1"/>
           </p:cNvSpPr>
@@ -2251,7 +2049,7 @@
           <a:p>
             <a:fld id="{641330C3-69DC-034B-8C0A-41DF52C199CB}" type="datetimeFigureOut">
               <a:rPr lang="en-US" smtClean="0"/>
-              <a:t>5/22/23</a:t>
+              <a:t>9/24/23</a:t>
             </a:fld>
             <a:endParaRPr lang="en-US"/>
           </a:p>
@@ -2259,13 +2057,7 @@
       </p:sp>
       <p:sp>
         <p:nvSpPr>
-          <p:cNvPr id="8" name="Footer Placeholder 7">
-            <a:extLst>
-              <a:ext uri="{FF2B5EF4-FFF2-40B4-BE49-F238E27FC236}">
-                <a16:creationId xmlns:a16="http://schemas.microsoft.com/office/drawing/2014/main" id="{EAF93E5B-45F7-DA51-C728-F8DB59CC54F9}"/>
-              </a:ext>
-            </a:extLst>
-          </p:cNvPr>
+          <p:cNvPr id="8" name="Footer Placeholder 7"/>
           <p:cNvSpPr>
             <a:spLocks noGrp="1"/>
           </p:cNvSpPr>
@@ -2284,13 +2076,7 @@
       </p:sp>
       <p:sp>
         <p:nvSpPr>
-          <p:cNvPr id="9" name="Slide Number Placeholder 8">
-            <a:extLst>
-              <a:ext uri="{FF2B5EF4-FFF2-40B4-BE49-F238E27FC236}">
-                <a16:creationId xmlns:a16="http://schemas.microsoft.com/office/drawing/2014/main" id="{9DE09C7D-31B3-C679-515D-FE37CCF7B12F}"/>
-              </a:ext>
-            </a:extLst>
-          </p:cNvPr>
+          <p:cNvPr id="9" name="Slide Number Placeholder 8"/>
           <p:cNvSpPr>
             <a:spLocks noGrp="1"/>
           </p:cNvSpPr>
@@ -2314,7 +2100,7 @@
     </p:spTree>
     <p:extLst>
       <p:ext uri="{BB962C8B-B14F-4D97-AF65-F5344CB8AC3E}">
-        <p14:creationId xmlns:p14="http://schemas.microsoft.com/office/powerpoint/2010/main" val="742553929"/>
+        <p14:creationId xmlns:p14="http://schemas.microsoft.com/office/powerpoint/2010/main" val="560755444"/>
       </p:ext>
     </p:extLst>
   </p:cSld>
@@ -2343,13 +2129,7 @@
       </p:grpSpPr>
       <p:sp>
         <p:nvSpPr>
-          <p:cNvPr id="2" name="Title 1">
-            <a:extLst>
-              <a:ext uri="{FF2B5EF4-FFF2-40B4-BE49-F238E27FC236}">
-                <a16:creationId xmlns:a16="http://schemas.microsoft.com/office/drawing/2014/main" id="{23A450B9-C8A0-227D-8BCE-8575619ADA17}"/>
-              </a:ext>
-            </a:extLst>
-          </p:cNvPr>
+          <p:cNvPr id="2" name="Title 1"/>
           <p:cNvSpPr>
             <a:spLocks noGrp="1"/>
           </p:cNvSpPr>
@@ -2366,18 +2146,13 @@
               <a:rPr lang="en-US"/>
               <a:t>Click to edit Master title style</a:t>
             </a:r>
-          </a:p>
-        </p:txBody>
-      </p:sp>
-      <p:sp>
-        <p:nvSpPr>
-          <p:cNvPr id="3" name="Date Placeholder 2">
-            <a:extLst>
-              <a:ext uri="{FF2B5EF4-FFF2-40B4-BE49-F238E27FC236}">
-                <a16:creationId xmlns:a16="http://schemas.microsoft.com/office/drawing/2014/main" id="{B14ADE97-A85A-BBE3-7966-DF78FC129052}"/>
-              </a:ext>
-            </a:extLst>
-          </p:cNvPr>
+            <a:endParaRPr lang="en-US" dirty="0"/>
+          </a:p>
+        </p:txBody>
+      </p:sp>
+      <p:sp>
+        <p:nvSpPr>
+          <p:cNvPr id="3" name="Date Placeholder 2"/>
           <p:cNvSpPr>
             <a:spLocks noGrp="1"/>
           </p:cNvSpPr>
@@ -2392,7 +2167,7 @@
           <a:p>
             <a:fld id="{641330C3-69DC-034B-8C0A-41DF52C199CB}" type="datetimeFigureOut">
               <a:rPr lang="en-US" smtClean="0"/>
-              <a:t>5/22/23</a:t>
+              <a:t>9/24/23</a:t>
             </a:fld>
             <a:endParaRPr lang="en-US"/>
           </a:p>
@@ -2400,13 +2175,7 @@
       </p:sp>
       <p:sp>
         <p:nvSpPr>
-          <p:cNvPr id="4" name="Footer Placeholder 3">
-            <a:extLst>
-              <a:ext uri="{FF2B5EF4-FFF2-40B4-BE49-F238E27FC236}">
-                <a16:creationId xmlns:a16="http://schemas.microsoft.com/office/drawing/2014/main" id="{5A1F94F2-FC57-293D-DBD1-2794CC2E350F}"/>
-              </a:ext>
-            </a:extLst>
-          </p:cNvPr>
+          <p:cNvPr id="4" name="Footer Placeholder 3"/>
           <p:cNvSpPr>
             <a:spLocks noGrp="1"/>
           </p:cNvSpPr>
@@ -2425,13 +2194,7 @@
       </p:sp>
       <p:sp>
         <p:nvSpPr>
-          <p:cNvPr id="5" name="Slide Number Placeholder 4">
-            <a:extLst>
-              <a:ext uri="{FF2B5EF4-FFF2-40B4-BE49-F238E27FC236}">
-                <a16:creationId xmlns:a16="http://schemas.microsoft.com/office/drawing/2014/main" id="{A305DAFE-ADA9-A12F-1C3A-177A06ABBD38}"/>
-              </a:ext>
-            </a:extLst>
-          </p:cNvPr>
+          <p:cNvPr id="5" name="Slide Number Placeholder 4"/>
           <p:cNvSpPr>
             <a:spLocks noGrp="1"/>
           </p:cNvSpPr>
@@ -2455,7 +2218,7 @@
     </p:spTree>
     <p:extLst>
       <p:ext uri="{BB962C8B-B14F-4D97-AF65-F5344CB8AC3E}">
-        <p14:creationId xmlns:p14="http://schemas.microsoft.com/office/powerpoint/2010/main" val="2949597810"/>
+        <p14:creationId xmlns:p14="http://schemas.microsoft.com/office/powerpoint/2010/main" val="435480303"/>
       </p:ext>
     </p:extLst>
   </p:cSld>
@@ -2484,13 +2247,7 @@
       </p:grpSpPr>
       <p:sp>
         <p:nvSpPr>
-          <p:cNvPr id="2" name="Date Placeholder 1">
-            <a:extLst>
-              <a:ext uri="{FF2B5EF4-FFF2-40B4-BE49-F238E27FC236}">
-                <a16:creationId xmlns:a16="http://schemas.microsoft.com/office/drawing/2014/main" id="{5FBE78AC-6496-E19A-98E8-BF2F4D0E095F}"/>
-              </a:ext>
-            </a:extLst>
-          </p:cNvPr>
+          <p:cNvPr id="2" name="Date Placeholder 1"/>
           <p:cNvSpPr>
             <a:spLocks noGrp="1"/>
           </p:cNvSpPr>
@@ -2505,7 +2262,7 @@
           <a:p>
             <a:fld id="{641330C3-69DC-034B-8C0A-41DF52C199CB}" type="datetimeFigureOut">
               <a:rPr lang="en-US" smtClean="0"/>
-              <a:t>5/22/23</a:t>
+              <a:t>9/24/23</a:t>
             </a:fld>
             <a:endParaRPr lang="en-US"/>
           </a:p>
@@ -2513,13 +2270,7 @@
       </p:sp>
       <p:sp>
         <p:nvSpPr>
-          <p:cNvPr id="3" name="Footer Placeholder 2">
-            <a:extLst>
-              <a:ext uri="{FF2B5EF4-FFF2-40B4-BE49-F238E27FC236}">
-                <a16:creationId xmlns:a16="http://schemas.microsoft.com/office/drawing/2014/main" id="{05C0B403-FCD6-6614-748C-15A96A2FCD98}"/>
-              </a:ext>
-            </a:extLst>
-          </p:cNvPr>
+          <p:cNvPr id="3" name="Footer Placeholder 2"/>
           <p:cNvSpPr>
             <a:spLocks noGrp="1"/>
           </p:cNvSpPr>
@@ -2538,13 +2289,7 @@
       </p:sp>
       <p:sp>
         <p:nvSpPr>
-          <p:cNvPr id="4" name="Slide Number Placeholder 3">
-            <a:extLst>
-              <a:ext uri="{FF2B5EF4-FFF2-40B4-BE49-F238E27FC236}">
-                <a16:creationId xmlns:a16="http://schemas.microsoft.com/office/drawing/2014/main" id="{D366DED3-63A2-55DF-6119-729D6F2D311E}"/>
-              </a:ext>
-            </a:extLst>
-          </p:cNvPr>
+          <p:cNvPr id="4" name="Slide Number Placeholder 3"/>
           <p:cNvSpPr>
             <a:spLocks noGrp="1"/>
           </p:cNvSpPr>
@@ -2568,7 +2313,7 @@
     </p:spTree>
     <p:extLst>
       <p:ext uri="{BB962C8B-B14F-4D97-AF65-F5344CB8AC3E}">
-        <p14:creationId xmlns:p14="http://schemas.microsoft.com/office/powerpoint/2010/main" val="1695143334"/>
+        <p14:creationId xmlns:p14="http://schemas.microsoft.com/office/powerpoint/2010/main" val="3961799429"/>
       </p:ext>
     </p:extLst>
   </p:cSld>
@@ -2597,13 +2342,7 @@
       </p:grpSpPr>
       <p:sp>
         <p:nvSpPr>
-          <p:cNvPr id="2" name="Title 1">
-            <a:extLst>
-              <a:ext uri="{FF2B5EF4-FFF2-40B4-BE49-F238E27FC236}">
-                <a16:creationId xmlns:a16="http://schemas.microsoft.com/office/drawing/2014/main" id="{0C2EFF4E-E825-8A01-7A5D-719AE399D080}"/>
-              </a:ext>
-            </a:extLst>
-          </p:cNvPr>
+          <p:cNvPr id="2" name="Title 1"/>
           <p:cNvSpPr>
             <a:spLocks noGrp="1"/>
           </p:cNvSpPr>
@@ -2613,8 +2352,8 @@
         </p:nvSpPr>
         <p:spPr>
           <a:xfrm>
-            <a:off x="839788" y="457200"/>
-            <a:ext cx="3932237" cy="1600200"/>
+            <a:off x="1133714" y="457200"/>
+            <a:ext cx="5308520" cy="1600200"/>
           </a:xfrm>
         </p:spPr>
         <p:txBody>
@@ -2629,18 +2368,13 @@
               <a:rPr lang="en-US"/>
               <a:t>Click to edit Master title style</a:t>
             </a:r>
-          </a:p>
-        </p:txBody>
-      </p:sp>
-      <p:sp>
-        <p:nvSpPr>
-          <p:cNvPr id="3" name="Content Placeholder 2">
-            <a:extLst>
-              <a:ext uri="{FF2B5EF4-FFF2-40B4-BE49-F238E27FC236}">
-                <a16:creationId xmlns:a16="http://schemas.microsoft.com/office/drawing/2014/main" id="{52360E23-8BA3-EA8F-36DB-8D17C075B2A7}"/>
-              </a:ext>
-            </a:extLst>
-          </p:cNvPr>
+            <a:endParaRPr lang="en-US" dirty="0"/>
+          </a:p>
+        </p:txBody>
+      </p:sp>
+      <p:sp>
+        <p:nvSpPr>
+          <p:cNvPr id="3" name="Content Placeholder 2"/>
           <p:cNvSpPr>
             <a:spLocks noGrp="1"/>
           </p:cNvSpPr>
@@ -2650,8 +2384,8 @@
         </p:nvSpPr>
         <p:spPr>
           <a:xfrm>
-            <a:off x="5183188" y="987425"/>
-            <a:ext cx="6172200" cy="4873625"/>
+            <a:off x="6997304" y="987426"/>
+            <a:ext cx="8332470" cy="4873625"/>
           </a:xfrm>
         </p:spPr>
         <p:txBody>
@@ -2719,18 +2453,13 @@
               <a:rPr lang="en-US"/>
               <a:t>Fifth level</a:t>
             </a:r>
-          </a:p>
-        </p:txBody>
-      </p:sp>
-      <p:sp>
-        <p:nvSpPr>
-          <p:cNvPr id="4" name="Text Placeholder 3">
-            <a:extLst>
-              <a:ext uri="{FF2B5EF4-FFF2-40B4-BE49-F238E27FC236}">
-                <a16:creationId xmlns:a16="http://schemas.microsoft.com/office/drawing/2014/main" id="{1D67B877-F231-3FBC-ACE1-949BF6AEBE96}"/>
-              </a:ext>
-            </a:extLst>
-          </p:cNvPr>
+            <a:endParaRPr lang="en-US" dirty="0"/>
+          </a:p>
+        </p:txBody>
+      </p:sp>
+      <p:sp>
+        <p:nvSpPr>
+          <p:cNvPr id="4" name="Text Placeholder 3"/>
           <p:cNvSpPr>
             <a:spLocks noGrp="1"/>
           </p:cNvSpPr>
@@ -2740,8 +2469,8 @@
         </p:nvSpPr>
         <p:spPr>
           <a:xfrm>
-            <a:off x="839788" y="2057400"/>
-            <a:ext cx="3932237" cy="3811588"/>
+            <a:off x="1133714" y="2057400"/>
+            <a:ext cx="5308520" cy="3811588"/>
           </a:xfrm>
         </p:spPr>
         <p:txBody>
@@ -2795,13 +2524,7 @@
       </p:sp>
       <p:sp>
         <p:nvSpPr>
-          <p:cNvPr id="5" name="Date Placeholder 4">
-            <a:extLst>
-              <a:ext uri="{FF2B5EF4-FFF2-40B4-BE49-F238E27FC236}">
-                <a16:creationId xmlns:a16="http://schemas.microsoft.com/office/drawing/2014/main" id="{F6FD40BC-D8B1-8AF5-FB62-2B794C05CF91}"/>
-              </a:ext>
-            </a:extLst>
-          </p:cNvPr>
+          <p:cNvPr id="5" name="Date Placeholder 4"/>
           <p:cNvSpPr>
             <a:spLocks noGrp="1"/>
           </p:cNvSpPr>
@@ -2816,7 +2539,7 @@
           <a:p>
             <a:fld id="{641330C3-69DC-034B-8C0A-41DF52C199CB}" type="datetimeFigureOut">
               <a:rPr lang="en-US" smtClean="0"/>
-              <a:t>5/22/23</a:t>
+              <a:t>9/24/23</a:t>
             </a:fld>
             <a:endParaRPr lang="en-US"/>
           </a:p>
@@ -2824,13 +2547,7 @@
       </p:sp>
       <p:sp>
         <p:nvSpPr>
-          <p:cNvPr id="6" name="Footer Placeholder 5">
-            <a:extLst>
-              <a:ext uri="{FF2B5EF4-FFF2-40B4-BE49-F238E27FC236}">
-                <a16:creationId xmlns:a16="http://schemas.microsoft.com/office/drawing/2014/main" id="{76A2A9DC-6C47-0FD2-C212-0755E8493958}"/>
-              </a:ext>
-            </a:extLst>
-          </p:cNvPr>
+          <p:cNvPr id="6" name="Footer Placeholder 5"/>
           <p:cNvSpPr>
             <a:spLocks noGrp="1"/>
           </p:cNvSpPr>
@@ -2849,13 +2566,7 @@
       </p:sp>
       <p:sp>
         <p:nvSpPr>
-          <p:cNvPr id="7" name="Slide Number Placeholder 6">
-            <a:extLst>
-              <a:ext uri="{FF2B5EF4-FFF2-40B4-BE49-F238E27FC236}">
-                <a16:creationId xmlns:a16="http://schemas.microsoft.com/office/drawing/2014/main" id="{FDAAA4F9-EE75-F8E5-E165-B03CC2516C7C}"/>
-              </a:ext>
-            </a:extLst>
-          </p:cNvPr>
+          <p:cNvPr id="7" name="Slide Number Placeholder 6"/>
           <p:cNvSpPr>
             <a:spLocks noGrp="1"/>
           </p:cNvSpPr>
@@ -2879,7 +2590,7 @@
     </p:spTree>
     <p:extLst>
       <p:ext uri="{BB962C8B-B14F-4D97-AF65-F5344CB8AC3E}">
-        <p14:creationId xmlns:p14="http://schemas.microsoft.com/office/powerpoint/2010/main" val="2942531479"/>
+        <p14:creationId xmlns:p14="http://schemas.microsoft.com/office/powerpoint/2010/main" val="2707877828"/>
       </p:ext>
     </p:extLst>
   </p:cSld>
@@ -2908,13 +2619,7 @@
       </p:grpSpPr>
       <p:sp>
         <p:nvSpPr>
-          <p:cNvPr id="2" name="Title 1">
-            <a:extLst>
-              <a:ext uri="{FF2B5EF4-FFF2-40B4-BE49-F238E27FC236}">
-                <a16:creationId xmlns:a16="http://schemas.microsoft.com/office/drawing/2014/main" id="{94A97DCB-6010-F035-743E-50969718671A}"/>
-              </a:ext>
-            </a:extLst>
-          </p:cNvPr>
+          <p:cNvPr id="2" name="Title 1"/>
           <p:cNvSpPr>
             <a:spLocks noGrp="1"/>
           </p:cNvSpPr>
@@ -2924,8 +2629,8 @@
         </p:nvSpPr>
         <p:spPr>
           <a:xfrm>
-            <a:off x="839788" y="457200"/>
-            <a:ext cx="3932237" cy="1600200"/>
+            <a:off x="1133714" y="457200"/>
+            <a:ext cx="5308520" cy="1600200"/>
           </a:xfrm>
         </p:spPr>
         <p:txBody>
@@ -2940,20 +2645,15 @@
               <a:rPr lang="en-US"/>
               <a:t>Click to edit Master title style</a:t>
             </a:r>
-          </a:p>
-        </p:txBody>
-      </p:sp>
-      <p:sp>
-        <p:nvSpPr>
-          <p:cNvPr id="3" name="Picture Placeholder 2">
-            <a:extLst>
-              <a:ext uri="{FF2B5EF4-FFF2-40B4-BE49-F238E27FC236}">
-                <a16:creationId xmlns:a16="http://schemas.microsoft.com/office/drawing/2014/main" id="{CA2F9C46-7DB1-F6E5-7D83-376C39523AF1}"/>
-              </a:ext>
-            </a:extLst>
-          </p:cNvPr>
-          <p:cNvSpPr>
-            <a:spLocks noGrp="1"/>
+            <a:endParaRPr lang="en-US" dirty="0"/>
+          </a:p>
+        </p:txBody>
+      </p:sp>
+      <p:sp>
+        <p:nvSpPr>
+          <p:cNvPr id="3" name="Picture Placeholder 2"/>
+          <p:cNvSpPr>
+            <a:spLocks noGrp="1" noChangeAspect="1"/>
           </p:cNvSpPr>
           <p:nvPr>
             <p:ph type="pic" idx="1"/>
@@ -2961,8 +2661,73 @@
         </p:nvSpPr>
         <p:spPr>
           <a:xfrm>
-            <a:off x="5183188" y="987425"/>
-            <a:ext cx="6172200" cy="4873625"/>
+            <a:off x="6997304" y="987426"/>
+            <a:ext cx="8332470" cy="4873625"/>
+          </a:xfrm>
+        </p:spPr>
+        <p:txBody>
+          <a:bodyPr anchor="t"/>
+          <a:lstStyle>
+            <a:lvl1pPr marL="0" indent="0">
+              <a:buNone/>
+              <a:defRPr sz="3200"/>
+            </a:lvl1pPr>
+            <a:lvl2pPr marL="457200" indent="0">
+              <a:buNone/>
+              <a:defRPr sz="2800"/>
+            </a:lvl2pPr>
+            <a:lvl3pPr marL="914400" indent="0">
+              <a:buNone/>
+              <a:defRPr sz="2400"/>
+            </a:lvl3pPr>
+            <a:lvl4pPr marL="1371600" indent="0">
+              <a:buNone/>
+              <a:defRPr sz="2000"/>
+            </a:lvl4pPr>
+            <a:lvl5pPr marL="1828800" indent="0">
+              <a:buNone/>
+              <a:defRPr sz="2000"/>
+            </a:lvl5pPr>
+            <a:lvl6pPr marL="2286000" indent="0">
+              <a:buNone/>
+              <a:defRPr sz="2000"/>
+            </a:lvl6pPr>
+            <a:lvl7pPr marL="2743200" indent="0">
+              <a:buNone/>
+              <a:defRPr sz="2000"/>
+            </a:lvl7pPr>
+            <a:lvl8pPr marL="3200400" indent="0">
+              <a:buNone/>
+              <a:defRPr sz="2000"/>
+            </a:lvl8pPr>
+            <a:lvl9pPr marL="3657600" indent="0">
+              <a:buNone/>
+              <a:defRPr sz="2000"/>
+            </a:lvl9pPr>
+          </a:lstStyle>
+          <a:p>
+            <a:r>
+              <a:rPr lang="en-US"/>
+              <a:t>Click icon to add picture</a:t>
+            </a:r>
+            <a:endParaRPr lang="en-US" dirty="0"/>
+          </a:p>
+        </p:txBody>
+      </p:sp>
+      <p:sp>
+        <p:nvSpPr>
+          <p:cNvPr id="4" name="Text Placeholder 3"/>
+          <p:cNvSpPr>
+            <a:spLocks noGrp="1"/>
+          </p:cNvSpPr>
+          <p:nvPr>
+            <p:ph type="body" sz="half" idx="2"/>
+          </p:nvPr>
+        </p:nvSpPr>
+        <p:spPr>
+          <a:xfrm>
+            <a:off x="1133714" y="2057400"/>
+            <a:ext cx="5308520" cy="3811588"/>
           </a:xfrm>
         </p:spPr>
         <p:txBody>
@@ -2970,73 +2735,6 @@
           <a:lstStyle>
             <a:lvl1pPr marL="0" indent="0">
               <a:buNone/>
-              <a:defRPr sz="3200"/>
-            </a:lvl1pPr>
-            <a:lvl2pPr marL="457200" indent="0">
-              <a:buNone/>
-              <a:defRPr sz="2800"/>
-            </a:lvl2pPr>
-            <a:lvl3pPr marL="914400" indent="0">
-              <a:buNone/>
-              <a:defRPr sz="2400"/>
-            </a:lvl3pPr>
-            <a:lvl4pPr marL="1371600" indent="0">
-              <a:buNone/>
-              <a:defRPr sz="2000"/>
-            </a:lvl4pPr>
-            <a:lvl5pPr marL="1828800" indent="0">
-              <a:buNone/>
-              <a:defRPr sz="2000"/>
-            </a:lvl5pPr>
-            <a:lvl6pPr marL="2286000" indent="0">
-              <a:buNone/>
-              <a:defRPr sz="2000"/>
-            </a:lvl6pPr>
-            <a:lvl7pPr marL="2743200" indent="0">
-              <a:buNone/>
-              <a:defRPr sz="2000"/>
-            </a:lvl7pPr>
-            <a:lvl8pPr marL="3200400" indent="0">
-              <a:buNone/>
-              <a:defRPr sz="2000"/>
-            </a:lvl8pPr>
-            <a:lvl9pPr marL="3657600" indent="0">
-              <a:buNone/>
-              <a:defRPr sz="2000"/>
-            </a:lvl9pPr>
-          </a:lstStyle>
-          <a:p>
-            <a:endParaRPr lang="en-US"/>
-          </a:p>
-        </p:txBody>
-      </p:sp>
-      <p:sp>
-        <p:nvSpPr>
-          <p:cNvPr id="4" name="Text Placeholder 3">
-            <a:extLst>
-              <a:ext uri="{FF2B5EF4-FFF2-40B4-BE49-F238E27FC236}">
-                <a16:creationId xmlns:a16="http://schemas.microsoft.com/office/drawing/2014/main" id="{2295C2DB-8035-B920-D4F8-29EC6BB504D5}"/>
-              </a:ext>
-            </a:extLst>
-          </p:cNvPr>
-          <p:cNvSpPr>
-            <a:spLocks noGrp="1"/>
-          </p:cNvSpPr>
-          <p:nvPr>
-            <p:ph type="body" sz="half" idx="2"/>
-          </p:nvPr>
-        </p:nvSpPr>
-        <p:spPr>
-          <a:xfrm>
-            <a:off x="839788" y="2057400"/>
-            <a:ext cx="3932237" cy="3811588"/>
-          </a:xfrm>
-        </p:spPr>
-        <p:txBody>
-          <a:bodyPr/>
-          <a:lstStyle>
-            <a:lvl1pPr marL="0" indent="0">
-              <a:buNone/>
               <a:defRPr sz="1600"/>
             </a:lvl1pPr>
             <a:lvl2pPr marL="457200" indent="0">
@@ -3083,13 +2781,7 @@
       </p:sp>
       <p:sp>
         <p:nvSpPr>
-          <p:cNvPr id="5" name="Date Placeholder 4">
-            <a:extLst>
-              <a:ext uri="{FF2B5EF4-FFF2-40B4-BE49-F238E27FC236}">
-                <a16:creationId xmlns:a16="http://schemas.microsoft.com/office/drawing/2014/main" id="{8247CB18-9442-9732-C523-136505D5E33C}"/>
-              </a:ext>
-            </a:extLst>
-          </p:cNvPr>
+          <p:cNvPr id="5" name="Date Placeholder 4"/>
           <p:cNvSpPr>
             <a:spLocks noGrp="1"/>
           </p:cNvSpPr>
@@ -3104,7 +2796,7 @@
           <a:p>
             <a:fld id="{641330C3-69DC-034B-8C0A-41DF52C199CB}" type="datetimeFigureOut">
               <a:rPr lang="en-US" smtClean="0"/>
-              <a:t>5/22/23</a:t>
+              <a:t>9/24/23</a:t>
             </a:fld>
             <a:endParaRPr lang="en-US"/>
           </a:p>
@@ -3112,13 +2804,7 @@
       </p:sp>
       <p:sp>
         <p:nvSpPr>
-          <p:cNvPr id="6" name="Footer Placeholder 5">
-            <a:extLst>
-              <a:ext uri="{FF2B5EF4-FFF2-40B4-BE49-F238E27FC236}">
-                <a16:creationId xmlns:a16="http://schemas.microsoft.com/office/drawing/2014/main" id="{634D3D04-E1C7-6DE3-4E60-8DB6DD86856F}"/>
-              </a:ext>
-            </a:extLst>
-          </p:cNvPr>
+          <p:cNvPr id="6" name="Footer Placeholder 5"/>
           <p:cNvSpPr>
             <a:spLocks noGrp="1"/>
           </p:cNvSpPr>
@@ -3137,13 +2823,7 @@
       </p:sp>
       <p:sp>
         <p:nvSpPr>
-          <p:cNvPr id="7" name="Slide Number Placeholder 6">
-            <a:extLst>
-              <a:ext uri="{FF2B5EF4-FFF2-40B4-BE49-F238E27FC236}">
-                <a16:creationId xmlns:a16="http://schemas.microsoft.com/office/drawing/2014/main" id="{EC7E6B36-3BBD-8120-C2C8-08CA7B78BAEE}"/>
-              </a:ext>
-            </a:extLst>
-          </p:cNvPr>
+          <p:cNvPr id="7" name="Slide Number Placeholder 6"/>
           <p:cNvSpPr>
             <a:spLocks noGrp="1"/>
           </p:cNvSpPr>
@@ -3167,7 +2847,7 @@
     </p:spTree>
     <p:extLst>
       <p:ext uri="{BB962C8B-B14F-4D97-AF65-F5344CB8AC3E}">
-        <p14:creationId xmlns:p14="http://schemas.microsoft.com/office/powerpoint/2010/main" val="4097587423"/>
+        <p14:creationId xmlns:p14="http://schemas.microsoft.com/office/powerpoint/2010/main" val="2270267281"/>
       </p:ext>
     </p:extLst>
   </p:cSld>
@@ -3201,13 +2881,7 @@
       </p:grpSpPr>
       <p:sp>
         <p:nvSpPr>
-          <p:cNvPr id="2" name="Title Placeholder 1">
-            <a:extLst>
-              <a:ext uri="{FF2B5EF4-FFF2-40B4-BE49-F238E27FC236}">
-                <a16:creationId xmlns:a16="http://schemas.microsoft.com/office/drawing/2014/main" id="{60C8B852-B33F-49D4-790B-47836A1C04F0}"/>
-              </a:ext>
-            </a:extLst>
-          </p:cNvPr>
+          <p:cNvPr id="2" name="Title Placeholder 1"/>
           <p:cNvSpPr>
             <a:spLocks noGrp="1"/>
           </p:cNvSpPr>
@@ -3217,8 +2891,8 @@
         </p:nvSpPr>
         <p:spPr>
           <a:xfrm>
-            <a:off x="838200" y="365125"/>
-            <a:ext cx="10515600" cy="1325563"/>
+            <a:off x="1131570" y="365126"/>
+            <a:ext cx="14196060" cy="1325563"/>
           </a:xfrm>
           <a:prstGeom prst="rect">
             <a:avLst/>
@@ -3234,18 +2908,13 @@
               <a:rPr lang="en-US"/>
               <a:t>Click to edit Master title style</a:t>
             </a:r>
-          </a:p>
-        </p:txBody>
-      </p:sp>
-      <p:sp>
-        <p:nvSpPr>
-          <p:cNvPr id="3" name="Text Placeholder 2">
-            <a:extLst>
-              <a:ext uri="{FF2B5EF4-FFF2-40B4-BE49-F238E27FC236}">
-                <a16:creationId xmlns:a16="http://schemas.microsoft.com/office/drawing/2014/main" id="{81C73A20-595A-CCEE-492F-4D563E8247A5}"/>
-              </a:ext>
-            </a:extLst>
-          </p:cNvPr>
+            <a:endParaRPr lang="en-US" dirty="0"/>
+          </a:p>
+        </p:txBody>
+      </p:sp>
+      <p:sp>
+        <p:nvSpPr>
+          <p:cNvPr id="3" name="Text Placeholder 2"/>
           <p:cNvSpPr>
             <a:spLocks noGrp="1"/>
           </p:cNvSpPr>
@@ -3255,8 +2924,8 @@
         </p:nvSpPr>
         <p:spPr>
           <a:xfrm>
-            <a:off x="838200" y="1825625"/>
-            <a:ext cx="10515600" cy="4351338"/>
+            <a:off x="1131570" y="1825625"/>
+            <a:ext cx="14196060" cy="4351338"/>
           </a:xfrm>
           <a:prstGeom prst="rect">
             <a:avLst/>
@@ -3301,18 +2970,13 @@
               <a:rPr lang="en-US"/>
               <a:t>Fifth level</a:t>
             </a:r>
-          </a:p>
-        </p:txBody>
-      </p:sp>
-      <p:sp>
-        <p:nvSpPr>
-          <p:cNvPr id="4" name="Date Placeholder 3">
-            <a:extLst>
-              <a:ext uri="{FF2B5EF4-FFF2-40B4-BE49-F238E27FC236}">
-                <a16:creationId xmlns:a16="http://schemas.microsoft.com/office/drawing/2014/main" id="{53F7EE87-9752-BF06-B050-62A92C91DD74}"/>
-              </a:ext>
-            </a:extLst>
-          </p:cNvPr>
+            <a:endParaRPr lang="en-US" dirty="0"/>
+          </a:p>
+        </p:txBody>
+      </p:sp>
+      <p:sp>
+        <p:nvSpPr>
+          <p:cNvPr id="4" name="Date Placeholder 3"/>
           <p:cNvSpPr>
             <a:spLocks noGrp="1"/>
           </p:cNvSpPr>
@@ -3322,8 +2986,8 @@
         </p:nvSpPr>
         <p:spPr>
           <a:xfrm>
-            <a:off x="838200" y="6356350"/>
-            <a:ext cx="2743200" cy="365125"/>
+            <a:off x="1131570" y="6356351"/>
+            <a:ext cx="3703320" cy="365125"/>
           </a:xfrm>
           <a:prstGeom prst="rect">
             <a:avLst/>
@@ -3345,7 +3009,7 @@
           <a:p>
             <a:fld id="{641330C3-69DC-034B-8C0A-41DF52C199CB}" type="datetimeFigureOut">
               <a:rPr lang="en-US" smtClean="0"/>
-              <a:t>5/22/23</a:t>
+              <a:t>9/24/23</a:t>
             </a:fld>
             <a:endParaRPr lang="en-US"/>
           </a:p>
@@ -3353,13 +3017,7 @@
       </p:sp>
       <p:sp>
         <p:nvSpPr>
-          <p:cNvPr id="5" name="Footer Placeholder 4">
-            <a:extLst>
-              <a:ext uri="{FF2B5EF4-FFF2-40B4-BE49-F238E27FC236}">
-                <a16:creationId xmlns:a16="http://schemas.microsoft.com/office/drawing/2014/main" id="{BDADD3DF-7F61-57D2-F30B-5ACA75420FDB}"/>
-              </a:ext>
-            </a:extLst>
-          </p:cNvPr>
+          <p:cNvPr id="5" name="Footer Placeholder 4"/>
           <p:cNvSpPr>
             <a:spLocks noGrp="1"/>
           </p:cNvSpPr>
@@ -3369,8 +3027,8 @@
         </p:nvSpPr>
         <p:spPr>
           <a:xfrm>
-            <a:off x="4038600" y="6356350"/>
-            <a:ext cx="4114800" cy="365125"/>
+            <a:off x="5452110" y="6356351"/>
+            <a:ext cx="5554980" cy="365125"/>
           </a:xfrm>
           <a:prstGeom prst="rect">
             <a:avLst/>
@@ -3396,13 +3054,7 @@
       </p:sp>
       <p:sp>
         <p:nvSpPr>
-          <p:cNvPr id="6" name="Slide Number Placeholder 5">
-            <a:extLst>
-              <a:ext uri="{FF2B5EF4-FFF2-40B4-BE49-F238E27FC236}">
-                <a16:creationId xmlns:a16="http://schemas.microsoft.com/office/drawing/2014/main" id="{B0BEF9C5-17D0-907D-EF6A-10D8B64F7982}"/>
-              </a:ext>
-            </a:extLst>
-          </p:cNvPr>
+          <p:cNvPr id="6" name="Slide Number Placeholder 5"/>
           <p:cNvSpPr>
             <a:spLocks noGrp="1"/>
           </p:cNvSpPr>
@@ -3412,8 +3064,8 @@
         </p:nvSpPr>
         <p:spPr>
           <a:xfrm>
-            <a:off x="8610600" y="6356350"/>
-            <a:ext cx="2743200" cy="365125"/>
+            <a:off x="11624310" y="6356351"/>
+            <a:ext cx="3703320" cy="365125"/>
           </a:xfrm>
           <a:prstGeom prst="rect">
             <a:avLst/>
@@ -3444,23 +3096,23 @@
     </p:spTree>
     <p:extLst>
       <p:ext uri="{BB962C8B-B14F-4D97-AF65-F5344CB8AC3E}">
-        <p14:creationId xmlns:p14="http://schemas.microsoft.com/office/powerpoint/2010/main" val="370053721"/>
+        <p14:creationId xmlns:p14="http://schemas.microsoft.com/office/powerpoint/2010/main" val="1504961500"/>
       </p:ext>
     </p:extLst>
   </p:cSld>
   <p:clrMap bg1="lt1" tx1="dk1" bg2="lt2" tx2="dk2" accent1="accent1" accent2="accent2" accent3="accent3" accent4="accent4" accent5="accent5" accent6="accent6" hlink="hlink" folHlink="folHlink"/>
   <p:sldLayoutIdLst>
-    <p:sldLayoutId id="2147483649" r:id="rId1"/>
-    <p:sldLayoutId id="2147483650" r:id="rId2"/>
-    <p:sldLayoutId id="2147483651" r:id="rId3"/>
-    <p:sldLayoutId id="2147483652" r:id="rId4"/>
-    <p:sldLayoutId id="2147483653" r:id="rId5"/>
-    <p:sldLayoutId id="2147483654" r:id="rId6"/>
-    <p:sldLayoutId id="2147483655" r:id="rId7"/>
-    <p:sldLayoutId id="2147483656" r:id="rId8"/>
-    <p:sldLayoutId id="2147483657" r:id="rId9"/>
-    <p:sldLayoutId id="2147483658" r:id="rId10"/>
-    <p:sldLayoutId id="2147483659" r:id="rId11"/>
+    <p:sldLayoutId id="2147483673" r:id="rId1"/>
+    <p:sldLayoutId id="2147483674" r:id="rId2"/>
+    <p:sldLayoutId id="2147483675" r:id="rId3"/>
+    <p:sldLayoutId id="2147483676" r:id="rId4"/>
+    <p:sldLayoutId id="2147483677" r:id="rId5"/>
+    <p:sldLayoutId id="2147483678" r:id="rId6"/>
+    <p:sldLayoutId id="2147483679" r:id="rId7"/>
+    <p:sldLayoutId id="2147483680" r:id="rId8"/>
+    <p:sldLayoutId id="2147483681" r:id="rId9"/>
+    <p:sldLayoutId id="2147483682" r:id="rId10"/>
+    <p:sldLayoutId id="2147483683" r:id="rId11"/>
   </p:sldLayoutIdLst>
   <p:txStyles>
     <p:titleStyle>
@@ -3770,160 +3422,6 @@
           <a:chExt cx="0" cy="0"/>
         </a:xfrm>
       </p:grpSpPr>
-      <p:sp useBgFill="1">
-        <p:nvSpPr>
-          <p:cNvPr id="16" name="Rectangle 15">
-            <a:extLst>
-              <a:ext uri="{FF2B5EF4-FFF2-40B4-BE49-F238E27FC236}">
-                <a16:creationId xmlns:a16="http://schemas.microsoft.com/office/drawing/2014/main" id="{E8DC6FCD-811B-436E-9FEE-FC957486CD7E}"/>
-              </a:ext>
-              <a:ext uri="{C183D7F6-B498-43B3-948B-1728B52AA6E4}">
-                <adec:decorative xmlns:adec="http://schemas.microsoft.com/office/drawing/2017/decorative" val="1"/>
-              </a:ext>
-            </a:extLst>
-          </p:cNvPr>
-          <p:cNvSpPr>
-            <a:spLocks noGrp="1" noRot="1" noChangeAspect="1" noMove="1" noResize="1" noEditPoints="1" noAdjustHandles="1" noChangeArrowheads="1" noChangeShapeType="1" noTextEdit="1"/>
-          </p:cNvSpPr>
-          <p:nvPr>
-            <p:extLst>
-              <p:ext uri="{386F3935-93C4-4BCD-93E2-E3B085C9AB24}">
-                <p16:designElem xmlns:p16="http://schemas.microsoft.com/office/powerpoint/2015/main" val="1"/>
-              </p:ext>
-            </p:extLst>
-          </p:nvPr>
-        </p:nvSpPr>
-        <p:spPr bwMode="white">
-          <a:xfrm>
-            <a:off x="1524" y="0"/>
-            <a:ext cx="12188952" cy="6858000"/>
-          </a:xfrm>
-          <a:prstGeom prst="rect">
-            <a:avLst/>
-          </a:prstGeom>
-          <a:ln>
-            <a:noFill/>
-          </a:ln>
-        </p:spPr>
-        <p:style>
-          <a:lnRef idx="2">
-            <a:schemeClr val="accent1">
-              <a:shade val="50000"/>
-            </a:schemeClr>
-          </a:lnRef>
-          <a:fillRef idx="1">
-            <a:schemeClr val="accent1"/>
-          </a:fillRef>
-          <a:effectRef idx="0">
-            <a:schemeClr val="accent1"/>
-          </a:effectRef>
-          <a:fontRef idx="minor">
-            <a:schemeClr val="lt1"/>
-          </a:fontRef>
-        </p:style>
-        <p:txBody>
-          <a:bodyPr rtlCol="0" anchor="ctr"/>
-          <a:lstStyle>
-            <a:defPPr>
-              <a:defRPr lang="en-US"/>
-            </a:defPPr>
-            <a:lvl1pPr marL="0" algn="l" defTabSz="914400" rtl="0" eaLnBrk="1" latinLnBrk="0" hangingPunct="1">
-              <a:defRPr sz="1800" kern="1200">
-                <a:solidFill>
-                  <a:schemeClr val="lt1"/>
-                </a:solidFill>
-                <a:latin typeface="+mn-lt"/>
-                <a:ea typeface="+mn-ea"/>
-                <a:cs typeface="+mn-cs"/>
-              </a:defRPr>
-            </a:lvl1pPr>
-            <a:lvl2pPr marL="457200" algn="l" defTabSz="914400" rtl="0" eaLnBrk="1" latinLnBrk="0" hangingPunct="1">
-              <a:defRPr sz="1800" kern="1200">
-                <a:solidFill>
-                  <a:schemeClr val="lt1"/>
-                </a:solidFill>
-                <a:latin typeface="+mn-lt"/>
-                <a:ea typeface="+mn-ea"/>
-                <a:cs typeface="+mn-cs"/>
-              </a:defRPr>
-            </a:lvl2pPr>
-            <a:lvl3pPr marL="914400" algn="l" defTabSz="914400" rtl="0" eaLnBrk="1" latinLnBrk="0" hangingPunct="1">
-              <a:defRPr sz="1800" kern="1200">
-                <a:solidFill>
-                  <a:schemeClr val="lt1"/>
-                </a:solidFill>
-                <a:latin typeface="+mn-lt"/>
-                <a:ea typeface="+mn-ea"/>
-                <a:cs typeface="+mn-cs"/>
-              </a:defRPr>
-            </a:lvl3pPr>
-            <a:lvl4pPr marL="1371600" algn="l" defTabSz="914400" rtl="0" eaLnBrk="1" latinLnBrk="0" hangingPunct="1">
-              <a:defRPr sz="1800" kern="1200">
-                <a:solidFill>
-                  <a:schemeClr val="lt1"/>
-                </a:solidFill>
-                <a:latin typeface="+mn-lt"/>
-                <a:ea typeface="+mn-ea"/>
-                <a:cs typeface="+mn-cs"/>
-              </a:defRPr>
-            </a:lvl4pPr>
-            <a:lvl5pPr marL="1828800" algn="l" defTabSz="914400" rtl="0" eaLnBrk="1" latinLnBrk="0" hangingPunct="1">
-              <a:defRPr sz="1800" kern="1200">
-                <a:solidFill>
-                  <a:schemeClr val="lt1"/>
-                </a:solidFill>
-                <a:latin typeface="+mn-lt"/>
-                <a:ea typeface="+mn-ea"/>
-                <a:cs typeface="+mn-cs"/>
-              </a:defRPr>
-            </a:lvl5pPr>
-            <a:lvl6pPr marL="2286000" algn="l" defTabSz="914400" rtl="0" eaLnBrk="1" latinLnBrk="0" hangingPunct="1">
-              <a:defRPr sz="1800" kern="1200">
-                <a:solidFill>
-                  <a:schemeClr val="lt1"/>
-                </a:solidFill>
-                <a:latin typeface="+mn-lt"/>
-                <a:ea typeface="+mn-ea"/>
-                <a:cs typeface="+mn-cs"/>
-              </a:defRPr>
-            </a:lvl6pPr>
-            <a:lvl7pPr marL="2743200" algn="l" defTabSz="914400" rtl="0" eaLnBrk="1" latinLnBrk="0" hangingPunct="1">
-              <a:defRPr sz="1800" kern="1200">
-                <a:solidFill>
-                  <a:schemeClr val="lt1"/>
-                </a:solidFill>
-                <a:latin typeface="+mn-lt"/>
-                <a:ea typeface="+mn-ea"/>
-                <a:cs typeface="+mn-cs"/>
-              </a:defRPr>
-            </a:lvl7pPr>
-            <a:lvl8pPr marL="3200400" algn="l" defTabSz="914400" rtl="0" eaLnBrk="1" latinLnBrk="0" hangingPunct="1">
-              <a:defRPr sz="1800" kern="1200">
-                <a:solidFill>
-                  <a:schemeClr val="lt1"/>
-                </a:solidFill>
-                <a:latin typeface="+mn-lt"/>
-                <a:ea typeface="+mn-ea"/>
-                <a:cs typeface="+mn-cs"/>
-              </a:defRPr>
-            </a:lvl8pPr>
-            <a:lvl9pPr marL="3657600" algn="l" defTabSz="914400" rtl="0" eaLnBrk="1" latinLnBrk="0" hangingPunct="1">
-              <a:defRPr sz="1800" kern="1200">
-                <a:solidFill>
-                  <a:schemeClr val="lt1"/>
-                </a:solidFill>
-                <a:latin typeface="+mn-lt"/>
-                <a:ea typeface="+mn-ea"/>
-                <a:cs typeface="+mn-cs"/>
-              </a:defRPr>
-            </a:lvl9pPr>
-          </a:lstStyle>
-          <a:p>
-            <a:pPr algn="ctr"/>
-            <a:endParaRPr lang="en-US"/>
-          </a:p>
-        </p:txBody>
-      </p:sp>
       <p:pic>
         <p:nvPicPr>
           <p:cNvPr id="7" name="Picture 6">
@@ -3945,7 +3443,7 @@
         </p:blipFill>
         <p:spPr>
           <a:xfrm>
-            <a:off x="6595653" y="315352"/>
+            <a:off x="11006076" y="315352"/>
             <a:ext cx="5453124" cy="2975888"/>
           </a:xfrm>
           <a:prstGeom prst="rect">
@@ -3974,7 +3472,7 @@
         </p:blipFill>
         <p:spPr>
           <a:xfrm>
-            <a:off x="849050" y="306153"/>
+            <a:off x="5259473" y="306153"/>
             <a:ext cx="5447278" cy="2975888"/>
           </a:xfrm>
           <a:prstGeom prst="rect">
@@ -3996,7 +3494,7 @@
         </p:nvSpPr>
         <p:spPr>
           <a:xfrm>
-            <a:off x="198744" y="363255"/>
+            <a:off x="4609169" y="363257"/>
             <a:ext cx="350981" cy="461665"/>
           </a:xfrm>
           <a:prstGeom prst="rect">
@@ -4012,7 +3510,7 @@
           <a:p>
             <a:r>
               <a:rPr lang="en-US" sz="2400" b="1" dirty="0"/>
-              <a:t>A</a:t>
+              <a:t>B</a:t>
             </a:r>
           </a:p>
         </p:txBody>
@@ -4031,7 +3529,7 @@
         </p:nvSpPr>
         <p:spPr>
           <a:xfrm>
-            <a:off x="6096000" y="363254"/>
+            <a:off x="10506425" y="363256"/>
             <a:ext cx="350981" cy="461665"/>
           </a:xfrm>
           <a:prstGeom prst="rect">
@@ -4047,7 +3545,7 @@
           <a:p>
             <a:r>
               <a:rPr lang="en-US" sz="2400" b="1" dirty="0"/>
-              <a:t>B</a:t>
+              <a:t>C</a:t>
             </a:r>
           </a:p>
         </p:txBody>
@@ -4066,7 +3564,7 @@
         </p:nvSpPr>
         <p:spPr>
           <a:xfrm>
-            <a:off x="198744" y="3392314"/>
+            <a:off x="4609169" y="3392316"/>
             <a:ext cx="350981" cy="461665"/>
           </a:xfrm>
           <a:prstGeom prst="rect">
@@ -4082,7 +3580,7 @@
           <a:p>
             <a:r>
               <a:rPr lang="en-US" sz="2400" b="1" dirty="0"/>
-              <a:t>C</a:t>
+              <a:t>D</a:t>
             </a:r>
           </a:p>
         </p:txBody>
@@ -4101,7 +3599,7 @@
         </p:nvSpPr>
         <p:spPr>
           <a:xfrm>
-            <a:off x="6102974" y="3291240"/>
+            <a:off x="10513399" y="3291242"/>
             <a:ext cx="350981" cy="461665"/>
           </a:xfrm>
           <a:prstGeom prst="rect">
@@ -4117,7 +3615,7 @@
           <a:p>
             <a:r>
               <a:rPr lang="en-US" sz="2400" b="1" dirty="0"/>
-              <a:t>D</a:t>
+              <a:t>E</a:t>
             </a:r>
           </a:p>
         </p:txBody>
@@ -4136,7 +3634,7 @@
         </p:nvGrpSpPr>
         <p:grpSpPr>
           <a:xfrm>
-            <a:off x="6651175" y="3409891"/>
+            <a:off x="11061600" y="3409891"/>
             <a:ext cx="5170931" cy="3447288"/>
             <a:chOff x="549720" y="3381428"/>
             <a:chExt cx="5170931" cy="3447288"/>
@@ -4295,7 +3793,7 @@
         </p:nvGrpSpPr>
         <p:grpSpPr>
           <a:xfrm>
-            <a:off x="549720" y="3410712"/>
+            <a:off x="4960145" y="3410712"/>
             <a:ext cx="5170931" cy="3447288"/>
             <a:chOff x="6651175" y="3361350"/>
             <a:chExt cx="5170931" cy="3447288"/>
@@ -4440,6 +3938,757 @@
           </p:txBody>
         </p:sp>
       </p:grpSp>
+      <p:sp>
+        <p:nvSpPr>
+          <p:cNvPr id="8" name="TextBox 7">
+            <a:extLst>
+              <a:ext uri="{FF2B5EF4-FFF2-40B4-BE49-F238E27FC236}">
+                <a16:creationId xmlns:a16="http://schemas.microsoft.com/office/drawing/2014/main" id="{78BB4460-94BC-C744-70A9-CE0B2C753597}"/>
+              </a:ext>
+            </a:extLst>
+          </p:cNvPr>
+          <p:cNvSpPr txBox="1"/>
+          <p:nvPr/>
+        </p:nvSpPr>
+        <p:spPr>
+          <a:xfrm>
+            <a:off x="281009" y="363255"/>
+            <a:ext cx="350981" cy="461665"/>
+          </a:xfrm>
+          <a:prstGeom prst="rect">
+            <a:avLst/>
+          </a:prstGeom>
+          <a:noFill/>
+        </p:spPr>
+        <p:txBody>
+          <a:bodyPr wrap="square" rtlCol="0">
+            <a:spAutoFit/>
+          </a:bodyPr>
+          <a:lstStyle/>
+          <a:p>
+            <a:r>
+              <a:rPr lang="en-US" sz="2400" b="1" dirty="0"/>
+              <a:t>A</a:t>
+            </a:r>
+          </a:p>
+        </p:txBody>
+      </p:sp>
+      <p:pic>
+        <p:nvPicPr>
+          <p:cNvPr id="10" name="Picture 9">
+            <a:extLst>
+              <a:ext uri="{FF2B5EF4-FFF2-40B4-BE49-F238E27FC236}">
+                <a16:creationId xmlns:a16="http://schemas.microsoft.com/office/drawing/2014/main" id="{3742D734-522B-08FC-E4CD-AE3B79BCCE62}"/>
+              </a:ext>
+            </a:extLst>
+          </p:cNvPr>
+          <p:cNvPicPr>
+            <a:picLocks noChangeAspect="1"/>
+          </p:cNvPicPr>
+          <p:nvPr/>
+        </p:nvPicPr>
+        <p:blipFill rotWithShape="1">
+          <a:blip r:embed="rId7"/>
+          <a:srcRect l="27062" t="33264" r="43057" b="53064"/>
+          <a:stretch/>
+        </p:blipFill>
+        <p:spPr>
+          <a:xfrm rot="5400000">
+            <a:off x="-30358" y="4115622"/>
+            <a:ext cx="2851066" cy="922586"/>
+          </a:xfrm>
+          <a:prstGeom prst="rect">
+            <a:avLst/>
+          </a:prstGeom>
+          <a:ln>
+            <a:noFill/>
+          </a:ln>
+        </p:spPr>
+      </p:pic>
+      <p:pic>
+        <p:nvPicPr>
+          <p:cNvPr id="11" name="Picture 10">
+            <a:extLst>
+              <a:ext uri="{FF2B5EF4-FFF2-40B4-BE49-F238E27FC236}">
+                <a16:creationId xmlns:a16="http://schemas.microsoft.com/office/drawing/2014/main" id="{DE7C79D2-BA8A-7CBB-78F5-F1C72B5B55BD}"/>
+              </a:ext>
+            </a:extLst>
+          </p:cNvPr>
+          <p:cNvPicPr>
+            <a:picLocks noChangeAspect="1"/>
+          </p:cNvPicPr>
+          <p:nvPr/>
+        </p:nvPicPr>
+        <p:blipFill rotWithShape="1">
+          <a:blip r:embed="rId7"/>
+          <a:srcRect l="27062" t="33264" r="43057" b="53064"/>
+          <a:stretch/>
+        </p:blipFill>
+        <p:spPr>
+          <a:xfrm rot="14725339" flipH="1">
+            <a:off x="1647460" y="1904448"/>
+            <a:ext cx="2851066" cy="922586"/>
+          </a:xfrm>
+          <a:prstGeom prst="rect">
+            <a:avLst/>
+          </a:prstGeom>
+          <a:ln>
+            <a:noFill/>
+          </a:ln>
+        </p:spPr>
+      </p:pic>
+      <p:sp>
+        <p:nvSpPr>
+          <p:cNvPr id="18" name="Oval 17">
+            <a:extLst>
+              <a:ext uri="{FF2B5EF4-FFF2-40B4-BE49-F238E27FC236}">
+                <a16:creationId xmlns:a16="http://schemas.microsoft.com/office/drawing/2014/main" id="{6D8BF61F-D1C0-B072-C1BF-F591AD794EE6}"/>
+              </a:ext>
+            </a:extLst>
+          </p:cNvPr>
+          <p:cNvSpPr/>
+          <p:nvPr/>
+        </p:nvSpPr>
+        <p:spPr>
+          <a:xfrm>
+            <a:off x="1280875" y="3151382"/>
+            <a:ext cx="228600" cy="228600"/>
+          </a:xfrm>
+          <a:prstGeom prst="ellipse">
+            <a:avLst/>
+          </a:prstGeom>
+          <a:solidFill>
+            <a:srgbClr val="FF0000">
+              <a:alpha val="50000"/>
+            </a:srgbClr>
+          </a:solidFill>
+          <a:ln>
+            <a:noFill/>
+          </a:ln>
+        </p:spPr>
+        <p:style>
+          <a:lnRef idx="2">
+            <a:schemeClr val="accent1">
+              <a:shade val="15000"/>
+            </a:schemeClr>
+          </a:lnRef>
+          <a:fillRef idx="1">
+            <a:schemeClr val="accent1"/>
+          </a:fillRef>
+          <a:effectRef idx="0">
+            <a:schemeClr val="accent1"/>
+          </a:effectRef>
+          <a:fontRef idx="minor">
+            <a:schemeClr val="lt1"/>
+          </a:fontRef>
+        </p:style>
+        <p:txBody>
+          <a:bodyPr rtlCol="0" anchor="ctr"/>
+          <a:lstStyle/>
+          <a:p>
+            <a:pPr algn="ctr"/>
+            <a:endParaRPr lang="en-US"/>
+          </a:p>
+        </p:txBody>
+      </p:sp>
+      <p:sp>
+        <p:nvSpPr>
+          <p:cNvPr id="19" name="Oval 18">
+            <a:extLst>
+              <a:ext uri="{FF2B5EF4-FFF2-40B4-BE49-F238E27FC236}">
+                <a16:creationId xmlns:a16="http://schemas.microsoft.com/office/drawing/2014/main" id="{45071694-4E59-64B4-6127-39655BF3E65E}"/>
+              </a:ext>
+            </a:extLst>
+          </p:cNvPr>
+          <p:cNvSpPr/>
+          <p:nvPr/>
+        </p:nvSpPr>
+        <p:spPr>
+          <a:xfrm>
+            <a:off x="1060742" y="5716362"/>
+            <a:ext cx="228600" cy="228600"/>
+          </a:xfrm>
+          <a:prstGeom prst="ellipse">
+            <a:avLst/>
+          </a:prstGeom>
+          <a:solidFill>
+            <a:srgbClr val="FF0000">
+              <a:alpha val="50000"/>
+            </a:srgbClr>
+          </a:solidFill>
+          <a:ln>
+            <a:noFill/>
+          </a:ln>
+        </p:spPr>
+        <p:style>
+          <a:lnRef idx="2">
+            <a:schemeClr val="accent1">
+              <a:shade val="15000"/>
+            </a:schemeClr>
+          </a:lnRef>
+          <a:fillRef idx="1">
+            <a:schemeClr val="accent1"/>
+          </a:fillRef>
+          <a:effectRef idx="0">
+            <a:schemeClr val="accent1"/>
+          </a:effectRef>
+          <a:fontRef idx="minor">
+            <a:schemeClr val="lt1"/>
+          </a:fontRef>
+        </p:style>
+        <p:txBody>
+          <a:bodyPr rtlCol="0" anchor="ctr"/>
+          <a:lstStyle/>
+          <a:p>
+            <a:pPr algn="ctr"/>
+            <a:endParaRPr lang="en-US"/>
+          </a:p>
+        </p:txBody>
+      </p:sp>
+      <p:sp>
+        <p:nvSpPr>
+          <p:cNvPr id="20" name="Oval 19">
+            <a:extLst>
+              <a:ext uri="{FF2B5EF4-FFF2-40B4-BE49-F238E27FC236}">
+                <a16:creationId xmlns:a16="http://schemas.microsoft.com/office/drawing/2014/main" id="{46395888-303C-BE89-6FDF-4BD950B92A2F}"/>
+              </a:ext>
+            </a:extLst>
+          </p:cNvPr>
+          <p:cNvSpPr/>
+          <p:nvPr/>
+        </p:nvSpPr>
+        <p:spPr>
+          <a:xfrm>
+            <a:off x="1387292" y="4289058"/>
+            <a:ext cx="228600" cy="228600"/>
+          </a:xfrm>
+          <a:prstGeom prst="ellipse">
+            <a:avLst/>
+          </a:prstGeom>
+          <a:solidFill>
+            <a:srgbClr val="FF0000">
+              <a:alpha val="50000"/>
+            </a:srgbClr>
+          </a:solidFill>
+          <a:ln>
+            <a:noFill/>
+          </a:ln>
+        </p:spPr>
+        <p:style>
+          <a:lnRef idx="2">
+            <a:schemeClr val="accent1">
+              <a:shade val="15000"/>
+            </a:schemeClr>
+          </a:lnRef>
+          <a:fillRef idx="1">
+            <a:schemeClr val="accent1"/>
+          </a:fillRef>
+          <a:effectRef idx="0">
+            <a:schemeClr val="accent1"/>
+          </a:effectRef>
+          <a:fontRef idx="minor">
+            <a:schemeClr val="lt1"/>
+          </a:fontRef>
+        </p:style>
+        <p:txBody>
+          <a:bodyPr rtlCol="0" anchor="ctr"/>
+          <a:lstStyle/>
+          <a:p>
+            <a:pPr algn="ctr"/>
+            <a:endParaRPr lang="en-US"/>
+          </a:p>
+        </p:txBody>
+      </p:sp>
+      <p:sp>
+        <p:nvSpPr>
+          <p:cNvPr id="21" name="Oval 20">
+            <a:extLst>
+              <a:ext uri="{FF2B5EF4-FFF2-40B4-BE49-F238E27FC236}">
+                <a16:creationId xmlns:a16="http://schemas.microsoft.com/office/drawing/2014/main" id="{CFECB583-9442-67A3-9507-94BDBB429718}"/>
+              </a:ext>
+            </a:extLst>
+          </p:cNvPr>
+          <p:cNvSpPr/>
+          <p:nvPr/>
+        </p:nvSpPr>
+        <p:spPr>
+          <a:xfrm>
+            <a:off x="1367950" y="5358999"/>
+            <a:ext cx="228600" cy="228600"/>
+          </a:xfrm>
+          <a:prstGeom prst="ellipse">
+            <a:avLst/>
+          </a:prstGeom>
+          <a:solidFill>
+            <a:srgbClr val="FF0000">
+              <a:alpha val="50000"/>
+            </a:srgbClr>
+          </a:solidFill>
+          <a:ln>
+            <a:noFill/>
+          </a:ln>
+        </p:spPr>
+        <p:style>
+          <a:lnRef idx="2">
+            <a:schemeClr val="accent1">
+              <a:shade val="15000"/>
+            </a:schemeClr>
+          </a:lnRef>
+          <a:fillRef idx="1">
+            <a:schemeClr val="accent1"/>
+          </a:fillRef>
+          <a:effectRef idx="0">
+            <a:schemeClr val="accent1"/>
+          </a:effectRef>
+          <a:fontRef idx="minor">
+            <a:schemeClr val="lt1"/>
+          </a:fontRef>
+        </p:style>
+        <p:txBody>
+          <a:bodyPr rtlCol="0" anchor="ctr"/>
+          <a:lstStyle/>
+          <a:p>
+            <a:pPr algn="ctr"/>
+            <a:endParaRPr lang="en-US"/>
+          </a:p>
+        </p:txBody>
+      </p:sp>
+      <p:sp>
+        <p:nvSpPr>
+          <p:cNvPr id="22" name="Oval 21">
+            <a:extLst>
+              <a:ext uri="{FF2B5EF4-FFF2-40B4-BE49-F238E27FC236}">
+                <a16:creationId xmlns:a16="http://schemas.microsoft.com/office/drawing/2014/main" id="{202FF28F-4E6C-ECA0-2A05-A3346B93015E}"/>
+              </a:ext>
+            </a:extLst>
+          </p:cNvPr>
+          <p:cNvSpPr/>
+          <p:nvPr/>
+        </p:nvSpPr>
+        <p:spPr>
+          <a:xfrm>
+            <a:off x="2419275" y="1056153"/>
+            <a:ext cx="228600" cy="228600"/>
+          </a:xfrm>
+          <a:prstGeom prst="ellipse">
+            <a:avLst/>
+          </a:prstGeom>
+          <a:solidFill>
+            <a:srgbClr val="00B0F0">
+              <a:alpha val="50000"/>
+            </a:srgbClr>
+          </a:solidFill>
+          <a:ln>
+            <a:noFill/>
+          </a:ln>
+        </p:spPr>
+        <p:style>
+          <a:lnRef idx="2">
+            <a:schemeClr val="accent1">
+              <a:shade val="15000"/>
+            </a:schemeClr>
+          </a:lnRef>
+          <a:fillRef idx="1">
+            <a:schemeClr val="accent1"/>
+          </a:fillRef>
+          <a:effectRef idx="0">
+            <a:schemeClr val="accent1"/>
+          </a:effectRef>
+          <a:fontRef idx="minor">
+            <a:schemeClr val="lt1"/>
+          </a:fontRef>
+        </p:style>
+        <p:txBody>
+          <a:bodyPr rtlCol="0" anchor="ctr"/>
+          <a:lstStyle/>
+          <a:p>
+            <a:pPr algn="ctr"/>
+            <a:endParaRPr lang="en-US"/>
+          </a:p>
+        </p:txBody>
+      </p:sp>
+      <p:sp>
+        <p:nvSpPr>
+          <p:cNvPr id="23" name="Oval 22">
+            <a:extLst>
+              <a:ext uri="{FF2B5EF4-FFF2-40B4-BE49-F238E27FC236}">
+                <a16:creationId xmlns:a16="http://schemas.microsoft.com/office/drawing/2014/main" id="{A416E520-FFF3-D86D-AB78-F1D9F3D015F9}"/>
+              </a:ext>
+            </a:extLst>
+          </p:cNvPr>
+          <p:cNvSpPr/>
+          <p:nvPr/>
+        </p:nvSpPr>
+        <p:spPr>
+          <a:xfrm>
+            <a:off x="3678645" y="3301760"/>
+            <a:ext cx="228600" cy="228600"/>
+          </a:xfrm>
+          <a:prstGeom prst="ellipse">
+            <a:avLst/>
+          </a:prstGeom>
+          <a:solidFill>
+            <a:srgbClr val="00B0F0">
+              <a:alpha val="50000"/>
+            </a:srgbClr>
+          </a:solidFill>
+          <a:ln>
+            <a:noFill/>
+          </a:ln>
+        </p:spPr>
+        <p:style>
+          <a:lnRef idx="2">
+            <a:schemeClr val="accent1">
+              <a:shade val="15000"/>
+            </a:schemeClr>
+          </a:lnRef>
+          <a:fillRef idx="1">
+            <a:schemeClr val="accent1"/>
+          </a:fillRef>
+          <a:effectRef idx="0">
+            <a:schemeClr val="accent1"/>
+          </a:effectRef>
+          <a:fontRef idx="minor">
+            <a:schemeClr val="lt1"/>
+          </a:fontRef>
+        </p:style>
+        <p:txBody>
+          <a:bodyPr rtlCol="0" anchor="ctr"/>
+          <a:lstStyle/>
+          <a:p>
+            <a:pPr algn="ctr"/>
+            <a:endParaRPr lang="en-US"/>
+          </a:p>
+        </p:txBody>
+      </p:sp>
+      <p:sp>
+        <p:nvSpPr>
+          <p:cNvPr id="24" name="Oval 23">
+            <a:extLst>
+              <a:ext uri="{FF2B5EF4-FFF2-40B4-BE49-F238E27FC236}">
+                <a16:creationId xmlns:a16="http://schemas.microsoft.com/office/drawing/2014/main" id="{6B501B98-6D0E-6A78-AB8C-8C0985720E5F}"/>
+              </a:ext>
+            </a:extLst>
+          </p:cNvPr>
+          <p:cNvSpPr/>
+          <p:nvPr/>
+        </p:nvSpPr>
+        <p:spPr>
+          <a:xfrm>
+            <a:off x="2816541" y="2171009"/>
+            <a:ext cx="228600" cy="228600"/>
+          </a:xfrm>
+          <a:prstGeom prst="ellipse">
+            <a:avLst/>
+          </a:prstGeom>
+          <a:solidFill>
+            <a:srgbClr val="00B0F0">
+              <a:alpha val="50000"/>
+            </a:srgbClr>
+          </a:solidFill>
+          <a:ln>
+            <a:noFill/>
+          </a:ln>
+        </p:spPr>
+        <p:style>
+          <a:lnRef idx="2">
+            <a:schemeClr val="accent1">
+              <a:shade val="15000"/>
+            </a:schemeClr>
+          </a:lnRef>
+          <a:fillRef idx="1">
+            <a:schemeClr val="accent1"/>
+          </a:fillRef>
+          <a:effectRef idx="0">
+            <a:schemeClr val="accent1"/>
+          </a:effectRef>
+          <a:fontRef idx="minor">
+            <a:schemeClr val="lt1"/>
+          </a:fontRef>
+        </p:style>
+        <p:txBody>
+          <a:bodyPr rtlCol="0" anchor="ctr"/>
+          <a:lstStyle/>
+          <a:p>
+            <a:pPr algn="ctr"/>
+            <a:endParaRPr lang="en-US"/>
+          </a:p>
+        </p:txBody>
+      </p:sp>
+      <p:sp>
+        <p:nvSpPr>
+          <p:cNvPr id="25" name="Oval 24">
+            <a:extLst>
+              <a:ext uri="{FF2B5EF4-FFF2-40B4-BE49-F238E27FC236}">
+                <a16:creationId xmlns:a16="http://schemas.microsoft.com/office/drawing/2014/main" id="{9C728E53-8D30-3737-6D8F-1C3971A42ADE}"/>
+              </a:ext>
+            </a:extLst>
+          </p:cNvPr>
+          <p:cNvSpPr/>
+          <p:nvPr/>
+        </p:nvSpPr>
+        <p:spPr>
+          <a:xfrm>
+            <a:off x="3281846" y="3134448"/>
+            <a:ext cx="228600" cy="228600"/>
+          </a:xfrm>
+          <a:prstGeom prst="ellipse">
+            <a:avLst/>
+          </a:prstGeom>
+          <a:solidFill>
+            <a:srgbClr val="00B0F0">
+              <a:alpha val="50000"/>
+            </a:srgbClr>
+          </a:solidFill>
+          <a:ln>
+            <a:noFill/>
+          </a:ln>
+        </p:spPr>
+        <p:style>
+          <a:lnRef idx="2">
+            <a:schemeClr val="accent1">
+              <a:shade val="15000"/>
+            </a:schemeClr>
+          </a:lnRef>
+          <a:fillRef idx="1">
+            <a:schemeClr val="accent1"/>
+          </a:fillRef>
+          <a:effectRef idx="0">
+            <a:schemeClr val="accent1"/>
+          </a:effectRef>
+          <a:fontRef idx="minor">
+            <a:schemeClr val="lt1"/>
+          </a:fontRef>
+        </p:style>
+        <p:txBody>
+          <a:bodyPr rtlCol="0" anchor="ctr"/>
+          <a:lstStyle/>
+          <a:p>
+            <a:pPr algn="ctr"/>
+            <a:endParaRPr lang="en-US"/>
+          </a:p>
+        </p:txBody>
+      </p:sp>
+      <p:cxnSp>
+        <p:nvCxnSpPr>
+          <p:cNvPr id="27" name="Straight Connector 26">
+            <a:extLst>
+              <a:ext uri="{FF2B5EF4-FFF2-40B4-BE49-F238E27FC236}">
+                <a16:creationId xmlns:a16="http://schemas.microsoft.com/office/drawing/2014/main" id="{A7814C20-9F2C-3BF1-CCA5-237407D31087}"/>
+              </a:ext>
+            </a:extLst>
+          </p:cNvPr>
+          <p:cNvCxnSpPr>
+            <a:cxnSpLocks/>
+            <a:stCxn id="18" idx="7"/>
+            <a:endCxn id="24" idx="3"/>
+          </p:cNvCxnSpPr>
+          <p:nvPr/>
+        </p:nvCxnSpPr>
+        <p:spPr>
+          <a:xfrm flipV="1">
+            <a:off x="1475997" y="2366131"/>
+            <a:ext cx="1374022" cy="818729"/>
+          </a:xfrm>
+          <a:prstGeom prst="line">
+            <a:avLst/>
+          </a:prstGeom>
+          <a:ln w="38100">
+            <a:solidFill>
+              <a:schemeClr val="tx1"/>
+            </a:solidFill>
+          </a:ln>
+        </p:spPr>
+        <p:style>
+          <a:lnRef idx="1">
+            <a:schemeClr val="accent1"/>
+          </a:lnRef>
+          <a:fillRef idx="0">
+            <a:schemeClr val="accent1"/>
+          </a:fillRef>
+          <a:effectRef idx="0">
+            <a:schemeClr val="accent1"/>
+          </a:effectRef>
+          <a:fontRef idx="minor">
+            <a:schemeClr val="tx1"/>
+          </a:fontRef>
+        </p:style>
+      </p:cxnSp>
+      <p:cxnSp>
+        <p:nvCxnSpPr>
+          <p:cNvPr id="30" name="Straight Connector 29">
+            <a:extLst>
+              <a:ext uri="{FF2B5EF4-FFF2-40B4-BE49-F238E27FC236}">
+                <a16:creationId xmlns:a16="http://schemas.microsoft.com/office/drawing/2014/main" id="{B7EBCE8D-597F-4759-2404-6CCDC5881ACE}"/>
+              </a:ext>
+            </a:extLst>
+          </p:cNvPr>
+          <p:cNvCxnSpPr>
+            <a:cxnSpLocks/>
+            <a:endCxn id="25" idx="2"/>
+          </p:cNvCxnSpPr>
+          <p:nvPr/>
+        </p:nvCxnSpPr>
+        <p:spPr>
+          <a:xfrm flipV="1">
+            <a:off x="1509475" y="3248748"/>
+            <a:ext cx="1772371" cy="15022"/>
+          </a:xfrm>
+          <a:prstGeom prst="line">
+            <a:avLst/>
+          </a:prstGeom>
+          <a:ln w="28575">
+            <a:solidFill>
+              <a:schemeClr val="tx1">
+                <a:alpha val="25000"/>
+              </a:schemeClr>
+            </a:solidFill>
+            <a:prstDash val="dash"/>
+          </a:ln>
+        </p:spPr>
+        <p:style>
+          <a:lnRef idx="1">
+            <a:schemeClr val="dk1"/>
+          </a:lnRef>
+          <a:fillRef idx="0">
+            <a:schemeClr val="dk1"/>
+          </a:fillRef>
+          <a:effectRef idx="0">
+            <a:schemeClr val="dk1"/>
+          </a:effectRef>
+          <a:fontRef idx="minor">
+            <a:schemeClr val="tx1"/>
+          </a:fontRef>
+        </p:style>
+      </p:cxnSp>
+      <p:cxnSp>
+        <p:nvCxnSpPr>
+          <p:cNvPr id="34" name="Straight Connector 33">
+            <a:extLst>
+              <a:ext uri="{FF2B5EF4-FFF2-40B4-BE49-F238E27FC236}">
+                <a16:creationId xmlns:a16="http://schemas.microsoft.com/office/drawing/2014/main" id="{D1515DEF-2317-7DA0-A281-E2E100D38D6A}"/>
+              </a:ext>
+            </a:extLst>
+          </p:cNvPr>
+          <p:cNvCxnSpPr>
+            <a:stCxn id="10" idx="1"/>
+            <a:endCxn id="22" idx="3"/>
+          </p:cNvCxnSpPr>
+          <p:nvPr/>
+        </p:nvCxnSpPr>
+        <p:spPr>
+          <a:xfrm flipV="1">
+            <a:off x="1395175" y="1251275"/>
+            <a:ext cx="1057578" cy="1900107"/>
+          </a:xfrm>
+          <a:prstGeom prst="line">
+            <a:avLst/>
+          </a:prstGeom>
+          <a:ln w="28575">
+            <a:solidFill>
+              <a:schemeClr val="tx1">
+                <a:alpha val="25000"/>
+              </a:schemeClr>
+            </a:solidFill>
+            <a:prstDash val="dash"/>
+          </a:ln>
+        </p:spPr>
+        <p:style>
+          <a:lnRef idx="1">
+            <a:schemeClr val="accent1"/>
+          </a:lnRef>
+          <a:fillRef idx="0">
+            <a:schemeClr val="accent1"/>
+          </a:fillRef>
+          <a:effectRef idx="0">
+            <a:schemeClr val="accent1"/>
+          </a:effectRef>
+          <a:fontRef idx="minor">
+            <a:schemeClr val="tx1"/>
+          </a:fontRef>
+        </p:style>
+      </p:cxnSp>
+      <p:cxnSp>
+        <p:nvCxnSpPr>
+          <p:cNvPr id="39" name="Straight Connector 38">
+            <a:extLst>
+              <a:ext uri="{FF2B5EF4-FFF2-40B4-BE49-F238E27FC236}">
+                <a16:creationId xmlns:a16="http://schemas.microsoft.com/office/drawing/2014/main" id="{7E65D1C5-7F2A-2C6C-71A6-48B26954C71F}"/>
+              </a:ext>
+            </a:extLst>
+          </p:cNvPr>
+          <p:cNvCxnSpPr>
+            <a:endCxn id="23" idx="2"/>
+          </p:cNvCxnSpPr>
+          <p:nvPr/>
+        </p:nvCxnSpPr>
+        <p:spPr>
+          <a:xfrm>
+            <a:off x="1509475" y="3263770"/>
+            <a:ext cx="2169170" cy="152290"/>
+          </a:xfrm>
+          <a:prstGeom prst="line">
+            <a:avLst/>
+          </a:prstGeom>
+          <a:ln w="28575">
+            <a:solidFill>
+              <a:schemeClr val="tx1">
+                <a:alpha val="25000"/>
+              </a:schemeClr>
+            </a:solidFill>
+            <a:prstDash val="dash"/>
+          </a:ln>
+        </p:spPr>
+        <p:style>
+          <a:lnRef idx="1">
+            <a:schemeClr val="accent1"/>
+          </a:lnRef>
+          <a:fillRef idx="0">
+            <a:schemeClr val="accent1"/>
+          </a:fillRef>
+          <a:effectRef idx="0">
+            <a:schemeClr val="accent1"/>
+          </a:effectRef>
+          <a:fontRef idx="minor">
+            <a:schemeClr val="tx1"/>
+          </a:fontRef>
+        </p:style>
+      </p:cxnSp>
+      <p:sp>
+        <p:nvSpPr>
+          <p:cNvPr id="40" name="TextBox 39">
+            <a:extLst>
+              <a:ext uri="{FF2B5EF4-FFF2-40B4-BE49-F238E27FC236}">
+                <a16:creationId xmlns:a16="http://schemas.microsoft.com/office/drawing/2014/main" id="{6379FC10-E706-7E90-74F3-FE185638AECC}"/>
+              </a:ext>
+            </a:extLst>
+          </p:cNvPr>
+          <p:cNvSpPr txBox="1"/>
+          <p:nvPr/>
+        </p:nvSpPr>
+        <p:spPr>
+          <a:xfrm>
+            <a:off x="1904450" y="2302243"/>
+            <a:ext cx="670485" cy="369332"/>
+          </a:xfrm>
+          <a:prstGeom prst="rect">
+            <a:avLst/>
+          </a:prstGeom>
+          <a:noFill/>
+        </p:spPr>
+        <p:txBody>
+          <a:bodyPr wrap="square" rtlCol="0">
+            <a:spAutoFit/>
+          </a:bodyPr>
+          <a:lstStyle/>
+          <a:p>
+            <a:r>
+              <a:rPr lang="en-US" b="1" dirty="0"/>
+              <a:t>NND</a:t>
+            </a:r>
+          </a:p>
+        </p:txBody>
+      </p:sp>
     </p:spTree>
     <p:extLst>
       <p:ext uri="{BB962C8B-B14F-4D97-AF65-F5344CB8AC3E}">
@@ -4450,13 +4699,133 @@
   <p:clrMapOvr>
     <a:masterClrMapping/>
   </p:clrMapOvr>
+  <p:timing>
+    <p:tnLst>
+      <p:par>
+        <p:cTn id="1" dur="indefinite" restart="never" nodeType="tmRoot">
+          <p:childTnLst>
+            <p:seq concurrent="1" nextAc="seek">
+              <p:cTn id="2" dur="indefinite" nodeType="mainSeq">
+                <p:childTnLst>
+                  <p:par>
+                    <p:cTn id="3" fill="hold">
+                      <p:stCondLst>
+                        <p:cond delay="indefinite"/>
+                      </p:stCondLst>
+                      <p:childTnLst>
+                        <p:par>
+                          <p:cTn id="4" fill="hold">
+                            <p:stCondLst>
+                              <p:cond delay="0"/>
+                            </p:stCondLst>
+                            <p:childTnLst>
+                              <p:par>
+                                <p:cTn id="5" presetID="1" presetClass="entr" presetSubtype="0" fill="hold" nodeType="clickEffect">
+                                  <p:stCondLst>
+                                    <p:cond delay="0"/>
+                                  </p:stCondLst>
+                                  <p:childTnLst>
+                                    <p:set>
+                                      <p:cBhvr>
+                                        <p:cTn id="6" dur="1" fill="hold">
+                                          <p:stCondLst>
+                                            <p:cond delay="0"/>
+                                          </p:stCondLst>
+                                        </p:cTn>
+                                        <p:tgtEl>
+                                          <p:spTgt spid="10"/>
+                                        </p:tgtEl>
+                                        <p:attrNameLst>
+                                          <p:attrName>style.visibility</p:attrName>
+                                        </p:attrNameLst>
+                                      </p:cBhvr>
+                                      <p:to>
+                                        <p:strVal val="visible"/>
+                                      </p:to>
+                                    </p:set>
+                                  </p:childTnLst>
+                                </p:cTn>
+                              </p:par>
+                            </p:childTnLst>
+                          </p:cTn>
+                        </p:par>
+                      </p:childTnLst>
+                    </p:cTn>
+                  </p:par>
+                  <p:par>
+                    <p:cTn id="7" fill="hold">
+                      <p:stCondLst>
+                        <p:cond delay="indefinite"/>
+                      </p:stCondLst>
+                      <p:childTnLst>
+                        <p:par>
+                          <p:cTn id="8" fill="hold">
+                            <p:stCondLst>
+                              <p:cond delay="0"/>
+                            </p:stCondLst>
+                            <p:childTnLst>
+                              <p:par>
+                                <p:cTn id="9" presetID="1" presetClass="entr" presetSubtype="0" fill="hold" nodeType="clickEffect">
+                                  <p:stCondLst>
+                                    <p:cond delay="0"/>
+                                  </p:stCondLst>
+                                  <p:childTnLst>
+                                    <p:set>
+                                      <p:cBhvr>
+                                        <p:cTn id="10" dur="1" fill="hold">
+                                          <p:stCondLst>
+                                            <p:cond delay="0"/>
+                                          </p:stCondLst>
+                                        </p:cTn>
+                                        <p:tgtEl>
+                                          <p:spTgt spid="11"/>
+                                        </p:tgtEl>
+                                        <p:attrNameLst>
+                                          <p:attrName>style.visibility</p:attrName>
+                                        </p:attrNameLst>
+                                      </p:cBhvr>
+                                      <p:to>
+                                        <p:strVal val="visible"/>
+                                      </p:to>
+                                    </p:set>
+                                  </p:childTnLst>
+                                </p:cTn>
+                              </p:par>
+                            </p:childTnLst>
+                          </p:cTn>
+                        </p:par>
+                      </p:childTnLst>
+                    </p:cTn>
+                  </p:par>
+                </p:childTnLst>
+              </p:cTn>
+              <p:prevCondLst>
+                <p:cond evt="onPrev" delay="0">
+                  <p:tgtEl>
+                    <p:sldTgt/>
+                  </p:tgtEl>
+                </p:cond>
+              </p:prevCondLst>
+              <p:nextCondLst>
+                <p:cond evt="onNext" delay="0">
+                  <p:tgtEl>
+                    <p:sldTgt/>
+                  </p:tgtEl>
+                </p:cond>
+              </p:nextCondLst>
+            </p:seq>
+          </p:childTnLst>
+        </p:cTn>
+      </p:par>
+    </p:tnLst>
+  </p:timing>
 </p:sld>
 </file>
 
 <file path=ppt/theme/theme1.xml><?xml version="1.0" encoding="utf-8"?>
-<a:theme xmlns:a="http://schemas.openxmlformats.org/drawingml/2006/main" name="Office Theme">
+<a:theme xmlns:a="http://schemas.openxmlformats.org/drawingml/2006/main" name="Office 2013 - 2022 Theme">
   <a:themeElements>
-    <a:clrScheme name="Office">
+    <a:clrScheme name="Office 2013 - 2022 Theme">
       <a:dk1>
         <a:sysClr val="windowText" lastClr="000000"/>
       </a:dk1>
@@ -4494,7 +4863,7 @@
         <a:srgbClr val="954F72"/>
       </a:folHlink>
     </a:clrScheme>
-    <a:fontScheme name="Office">
+    <a:fontScheme name="Office 2013 - 2022 Theme">
       <a:majorFont>
         <a:latin typeface="Calibri Light" panose="020F0302020204030204"/>
         <a:ea typeface=""/>
@@ -4529,23 +4898,6 @@
         <a:font script="Viet" typeface="Times New Roman"/>
         <a:font script="Uigh" typeface="Microsoft Uighur"/>
         <a:font script="Geor" typeface="Sylfaen"/>
-        <a:font script="Armn" typeface="Arial"/>
-        <a:font script="Bugi" typeface="Leelawadee UI"/>
-        <a:font script="Bopo" typeface="Microsoft JhengHei"/>
-        <a:font script="Java" typeface="Javanese Text"/>
-        <a:font script="Lisu" typeface="Segoe UI"/>
-        <a:font script="Mymr" typeface="Myanmar Text"/>
-        <a:font script="Nkoo" typeface="Ebrima"/>
-        <a:font script="Olck" typeface="Nirmala UI"/>
-        <a:font script="Osma" typeface="Ebrima"/>
-        <a:font script="Phag" typeface="Phagspa"/>
-        <a:font script="Syrn" typeface="Estrangelo Edessa"/>
-        <a:font script="Syrj" typeface="Estrangelo Edessa"/>
-        <a:font script="Syre" typeface="Estrangelo Edessa"/>
-        <a:font script="Sora" typeface="Nirmala UI"/>
-        <a:font script="Tale" typeface="Microsoft Tai Le"/>
-        <a:font script="Talu" typeface="Microsoft New Tai Lue"/>
-        <a:font script="Tfng" typeface="Ebrima"/>
       </a:majorFont>
       <a:minorFont>
         <a:latin typeface="Calibri" panose="020F0502020204030204"/>
@@ -4581,26 +4933,9 @@
         <a:font script="Viet" typeface="Arial"/>
         <a:font script="Uigh" typeface="Microsoft Uighur"/>
         <a:font script="Geor" typeface="Sylfaen"/>
-        <a:font script="Armn" typeface="Arial"/>
-        <a:font script="Bugi" typeface="Leelawadee UI"/>
-        <a:font script="Bopo" typeface="Microsoft JhengHei"/>
-        <a:font script="Java" typeface="Javanese Text"/>
-        <a:font script="Lisu" typeface="Segoe UI"/>
-        <a:font script="Mymr" typeface="Myanmar Text"/>
-        <a:font script="Nkoo" typeface="Ebrima"/>
-        <a:font script="Olck" typeface="Nirmala UI"/>
-        <a:font script="Osma" typeface="Ebrima"/>
-        <a:font script="Phag" typeface="Phagspa"/>
-        <a:font script="Syrn" typeface="Estrangelo Edessa"/>
-        <a:font script="Syrj" typeface="Estrangelo Edessa"/>
-        <a:font script="Syre" typeface="Estrangelo Edessa"/>
-        <a:font script="Sora" typeface="Nirmala UI"/>
-        <a:font script="Tale" typeface="Microsoft Tai Le"/>
-        <a:font script="Talu" typeface="Microsoft New Tai Lue"/>
-        <a:font script="Tfng" typeface="Ebrima"/>
       </a:minorFont>
     </a:fontScheme>
-    <a:fmtScheme name="Office">
+    <a:fmtScheme name="Office 2013 - 2022 Theme">
       <a:fillStyleLst>
         <a:solidFill>
           <a:schemeClr val="phClr"/>
@@ -4742,7 +5077,7 @@
   <a:extraClrSchemeLst/>
   <a:extLst>
     <a:ext uri="{05A4C25C-085E-4340-85A3-A5531E510DB2}">
-      <thm15:themeFamily xmlns:thm15="http://schemas.microsoft.com/office/thememl/2012/main" name="Office Theme" id="{62F939B6-93AF-4DB8-9C6B-D6C7DFDC589F}" vid="{4A3C46E8-61CC-4603-A589-7422A47A8E4A}"/>
+      <thm15:themeFamily xmlns:thm15="http://schemas.microsoft.com/office/thememl/2012/main" name="Office 2013 - 2022 Theme" id="{62F939B6-93AF-4DB8-9C6B-D6C7DFDC589F}" vid="{4A3C46E8-61CC-4603-A589-7422A47A8E4A}"/>
     </a:ext>
   </a:extLst>
 </a:theme>

</xml_diff>